<commit_message>
expanded overview & included in further entities
</commit_message>
<xml_diff>
--- a/kubernetes/08_further_entities.pptx
+++ b/kubernetes/08_further_entities.pptx
@@ -5,16 +5,17 @@
     <p:sldMasterId id="2147483733" r:id="rId1"/>
   </p:sldMasterIdLst>
   <p:notesMasterIdLst>
-    <p:notesMasterId r:id="rId6"/>
+    <p:notesMasterId r:id="rId7"/>
   </p:notesMasterIdLst>
   <p:handoutMasterIdLst>
-    <p:handoutMasterId r:id="rId7"/>
+    <p:handoutMasterId r:id="rId8"/>
   </p:handoutMasterIdLst>
   <p:sldIdLst>
     <p:sldId id="433" r:id="rId2"/>
     <p:sldId id="442" r:id="rId3"/>
     <p:sldId id="447" r:id="rId4"/>
-    <p:sldId id="265" r:id="rId5"/>
+    <p:sldId id="449" r:id="rId5"/>
+    <p:sldId id="265" r:id="rId6"/>
   </p:sldIdLst>
   <p:sldSz cx="12195175" cy="6858000"/>
   <p:notesSz cx="6858000" cy="9144000"/>
@@ -5473,7 +5474,7 @@
         <p:spPr/>
         <p:txBody>
           <a:bodyPr>
-            <a:normAutofit lnSpcReduction="10000"/>
+            <a:normAutofit fontScale="62500" lnSpcReduction="20000"/>
           </a:bodyPr>
           <a:lstStyle/>
           <a:p>
@@ -5941,7 +5942,7 @@
             <a:fld id="{7D8C2C35-2B8A-446E-BEC0-FD36716C29AC}" type="slidenum">
               <a:rPr lang="en-US" smtClean="0"/>
               <a:pPr/>
-              <a:t>4</a:t>
+              <a:t>5</a:t>
             </a:fld>
             <a:endParaRPr lang="en-US" dirty="0"/>
           </a:p>
@@ -20202,6 +20203,2987 @@
 </file>
 
 <file path=ppt/slides/slide4.xml><?xml version="1.0" encoding="utf-8"?>
+<p:sld xmlns:a="http://schemas.openxmlformats.org/drawingml/2006/main" xmlns:r="http://schemas.openxmlformats.org/officeDocument/2006/relationships" xmlns:p="http://schemas.openxmlformats.org/presentationml/2006/main">
+  <p:cSld>
+    <p:spTree>
+      <p:nvGrpSpPr>
+        <p:cNvPr id="1" name=""/>
+        <p:cNvGrpSpPr/>
+        <p:nvPr/>
+      </p:nvGrpSpPr>
+      <p:grpSpPr>
+        <a:xfrm>
+          <a:off x="0" y="0"/>
+          <a:ext cx="0" cy="0"/>
+          <a:chOff x="0" y="0"/>
+          <a:chExt cx="0" cy="0"/>
+        </a:xfrm>
+      </p:grpSpPr>
+      <p:sp>
+        <p:nvSpPr>
+          <p:cNvPr id="3" name="Title 2">
+            <a:extLst>
+              <a:ext uri="{FF2B5EF4-FFF2-40B4-BE49-F238E27FC236}">
+                <a16:creationId xmlns:a16="http://schemas.microsoft.com/office/drawing/2014/main" id="{6BF5CF30-4312-4197-8DD2-116B13EB4099}"/>
+              </a:ext>
+            </a:extLst>
+          </p:cNvPr>
+          <p:cNvSpPr>
+            <a:spLocks noGrp="1"/>
+          </p:cNvSpPr>
+          <p:nvPr>
+            <p:ph type="title"/>
+          </p:nvPr>
+        </p:nvSpPr>
+        <p:spPr>
+          <a:xfrm>
+            <a:off x="504001" y="504000"/>
+            <a:ext cx="11186476" cy="738664"/>
+          </a:xfrm>
+        </p:spPr>
+        <p:txBody>
+          <a:bodyPr/>
+          <a:lstStyle/>
+          <a:p>
+            <a:r>
+              <a:rPr lang="en-US" dirty="0"/>
+              <a:t>Kubernetes Concepts Map</a:t>
+            </a:r>
+            <a:br>
+              <a:rPr lang="en-US"/>
+            </a:br>
+            <a:r>
+              <a:rPr lang="en-US" sz="2000" b="0"/>
+              <a:t>What </a:t>
+            </a:r>
+            <a:r>
+              <a:rPr lang="en-US" sz="2000" b="0" dirty="0"/>
+              <a:t>K8S object 'uses' which other object</a:t>
+            </a:r>
+            <a:r>
+              <a:rPr lang="en-US" dirty="0"/>
+              <a:t> </a:t>
+            </a:r>
+          </a:p>
+        </p:txBody>
+      </p:sp>
+      <p:sp>
+        <p:nvSpPr>
+          <p:cNvPr id="5" name="Rectangle: Rounded Corners 4">
+            <a:extLst>
+              <a:ext uri="{FF2B5EF4-FFF2-40B4-BE49-F238E27FC236}">
+                <a16:creationId xmlns:a16="http://schemas.microsoft.com/office/drawing/2014/main" id="{C4F07E9F-E655-4AD7-A436-4C7BF5902D16}"/>
+              </a:ext>
+            </a:extLst>
+          </p:cNvPr>
+          <p:cNvSpPr/>
+          <p:nvPr/>
+        </p:nvSpPr>
+        <p:spPr bwMode="gray">
+          <a:xfrm>
+            <a:off x="5678124" y="4481859"/>
+            <a:ext cx="1318846" cy="565639"/>
+          </a:xfrm>
+          <a:prstGeom prst="roundRect">
+            <a:avLst/>
+          </a:prstGeom>
+          <a:solidFill>
+            <a:schemeClr val="accent5">
+              <a:lumMod val="40000"/>
+              <a:lumOff val="60000"/>
+            </a:schemeClr>
+          </a:solidFill>
+          <a:ln w="12700" algn="ctr">
+            <a:solidFill>
+              <a:schemeClr val="bg1">
+                <a:lumMod val="75000"/>
+              </a:schemeClr>
+            </a:solidFill>
+            <a:miter lim="800000"/>
+            <a:headEnd/>
+            <a:tailEnd/>
+          </a:ln>
+        </p:spPr>
+        <p:txBody>
+          <a:bodyPr lIns="90000" tIns="72000" rIns="90000" bIns="72000" rtlCol="0" anchor="ctr"/>
+          <a:lstStyle/>
+          <a:p>
+            <a:pPr marR="0" algn="ctr" defTabSz="914400" eaLnBrk="1" fontAlgn="base" latinLnBrk="0" hangingPunct="1">
+              <a:lnSpc>
+                <a:spcPct val="100000"/>
+              </a:lnSpc>
+              <a:spcBef>
+                <a:spcPct val="50000"/>
+              </a:spcBef>
+              <a:spcAft>
+                <a:spcPct val="0"/>
+              </a:spcAft>
+              <a:buClr>
+                <a:srgbClr val="F0AB00"/>
+              </a:buClr>
+              <a:buSzPct val="80000"/>
+              <a:tabLst/>
+            </a:pPr>
+            <a:r>
+              <a:rPr kumimoji="0" lang="en-US" sz="1400" b="0" i="0" u="none" strike="noStrike" kern="0" cap="none" spc="0" normalizeH="0" baseline="0" noProof="0" dirty="0">
+                <a:ln>
+                  <a:noFill/>
+                </a:ln>
+                <a:effectLst/>
+                <a:uLnTx/>
+                <a:uFillTx/>
+                <a:ea typeface="Arial Unicode MS" pitchFamily="34" charset="-128"/>
+                <a:cs typeface="Arial Unicode MS" pitchFamily="34" charset="-128"/>
+              </a:rPr>
+              <a:t>Container </a:t>
+            </a:r>
+            <a:br>
+              <a:rPr kumimoji="0" lang="en-US" sz="1400" b="0" i="0" u="none" strike="noStrike" kern="0" cap="none" spc="0" normalizeH="0" baseline="0" noProof="0" dirty="0">
+                <a:ln>
+                  <a:noFill/>
+                </a:ln>
+                <a:effectLst/>
+                <a:uLnTx/>
+                <a:uFillTx/>
+                <a:ea typeface="Arial Unicode MS" pitchFamily="34" charset="-128"/>
+                <a:cs typeface="Arial Unicode MS" pitchFamily="34" charset="-128"/>
+              </a:rPr>
+            </a:br>
+            <a:r>
+              <a:rPr kumimoji="0" lang="en-US" sz="1400" b="0" i="0" u="none" strike="noStrike" kern="0" cap="none" spc="0" normalizeH="0" baseline="0" noProof="0" dirty="0">
+                <a:ln>
+                  <a:noFill/>
+                </a:ln>
+                <a:effectLst/>
+                <a:uLnTx/>
+                <a:uFillTx/>
+                <a:ea typeface="Arial Unicode MS" pitchFamily="34" charset="-128"/>
+                <a:cs typeface="Arial Unicode MS" pitchFamily="34" charset="-128"/>
+              </a:rPr>
+              <a:t>(your code)</a:t>
+            </a:r>
+          </a:p>
+        </p:txBody>
+      </p:sp>
+      <p:sp>
+        <p:nvSpPr>
+          <p:cNvPr id="8" name="Rectangle: Rounded Corners 7">
+            <a:extLst>
+              <a:ext uri="{FF2B5EF4-FFF2-40B4-BE49-F238E27FC236}">
+                <a16:creationId xmlns:a16="http://schemas.microsoft.com/office/drawing/2014/main" id="{9F675C24-6AA6-4252-AB0D-63557DC000C5}"/>
+              </a:ext>
+            </a:extLst>
+          </p:cNvPr>
+          <p:cNvSpPr/>
+          <p:nvPr/>
+        </p:nvSpPr>
+        <p:spPr bwMode="gray">
+          <a:xfrm>
+            <a:off x="5681297" y="3393828"/>
+            <a:ext cx="1318846" cy="888030"/>
+          </a:xfrm>
+          <a:prstGeom prst="roundRect">
+            <a:avLst/>
+          </a:prstGeom>
+          <a:solidFill>
+            <a:srgbClr val="66CCFF"/>
+          </a:solidFill>
+          <a:ln w="12700" algn="ctr">
+            <a:solidFill>
+              <a:schemeClr val="bg1">
+                <a:lumMod val="75000"/>
+              </a:schemeClr>
+            </a:solidFill>
+            <a:miter lim="800000"/>
+            <a:headEnd/>
+            <a:tailEnd/>
+          </a:ln>
+        </p:spPr>
+        <p:txBody>
+          <a:bodyPr lIns="90000" tIns="72000" rIns="90000" bIns="72000" rtlCol="0" anchor="ctr"/>
+          <a:lstStyle/>
+          <a:p>
+            <a:pPr marR="0" algn="ctr" defTabSz="914400" eaLnBrk="1" fontAlgn="base" latinLnBrk="0" hangingPunct="1">
+              <a:lnSpc>
+                <a:spcPct val="100000"/>
+              </a:lnSpc>
+              <a:spcBef>
+                <a:spcPct val="50000"/>
+              </a:spcBef>
+              <a:spcAft>
+                <a:spcPct val="0"/>
+              </a:spcAft>
+              <a:buClr>
+                <a:srgbClr val="F0AB00"/>
+              </a:buClr>
+              <a:buSzPct val="80000"/>
+              <a:tabLst/>
+            </a:pPr>
+            <a:r>
+              <a:rPr kumimoji="0" lang="en-US" sz="1400" b="0" i="0" u="none" strike="noStrike" kern="0" cap="none" spc="0" normalizeH="0" baseline="0" noProof="0" dirty="0">
+                <a:ln>
+                  <a:noFill/>
+                </a:ln>
+                <a:effectLst/>
+                <a:uLnTx/>
+                <a:uFillTx/>
+                <a:ea typeface="Arial Unicode MS" pitchFamily="34" charset="-128"/>
+                <a:cs typeface="Arial Unicode MS" pitchFamily="34" charset="-128"/>
+              </a:rPr>
+              <a:t>Pod</a:t>
+            </a:r>
+          </a:p>
+        </p:txBody>
+      </p:sp>
+      <p:sp>
+        <p:nvSpPr>
+          <p:cNvPr id="9" name="Rectangle: Rounded Corners 8">
+            <a:extLst>
+              <a:ext uri="{FF2B5EF4-FFF2-40B4-BE49-F238E27FC236}">
+                <a16:creationId xmlns:a16="http://schemas.microsoft.com/office/drawing/2014/main" id="{DA7E3FC4-DFE9-40CA-8325-2A441C81D0E5}"/>
+              </a:ext>
+            </a:extLst>
+          </p:cNvPr>
+          <p:cNvSpPr/>
+          <p:nvPr/>
+        </p:nvSpPr>
+        <p:spPr bwMode="gray">
+          <a:xfrm>
+            <a:off x="2448663" y="4454770"/>
+            <a:ext cx="1318846" cy="565639"/>
+          </a:xfrm>
+          <a:prstGeom prst="roundRect">
+            <a:avLst/>
+          </a:prstGeom>
+          <a:solidFill>
+            <a:srgbClr val="66CCFF"/>
+          </a:solidFill>
+          <a:ln w="12700" algn="ctr">
+            <a:solidFill>
+              <a:schemeClr val="bg1">
+                <a:lumMod val="75000"/>
+              </a:schemeClr>
+            </a:solidFill>
+            <a:miter lim="800000"/>
+            <a:headEnd/>
+            <a:tailEnd/>
+          </a:ln>
+        </p:spPr>
+        <p:txBody>
+          <a:bodyPr lIns="90000" tIns="72000" rIns="90000" bIns="72000" rtlCol="0" anchor="ctr"/>
+          <a:lstStyle/>
+          <a:p>
+            <a:pPr marR="0" algn="ctr" defTabSz="914400" eaLnBrk="1" fontAlgn="base" latinLnBrk="0" hangingPunct="1">
+              <a:lnSpc>
+                <a:spcPct val="100000"/>
+              </a:lnSpc>
+              <a:spcBef>
+                <a:spcPct val="50000"/>
+              </a:spcBef>
+              <a:spcAft>
+                <a:spcPct val="0"/>
+              </a:spcAft>
+              <a:buClr>
+                <a:srgbClr val="F0AB00"/>
+              </a:buClr>
+              <a:buSzPct val="80000"/>
+              <a:tabLst/>
+            </a:pPr>
+            <a:r>
+              <a:rPr kumimoji="0" lang="en-US" sz="1400" b="0" i="0" u="none" strike="noStrike" kern="0" cap="none" spc="0" normalizeH="0" baseline="0" noProof="0" dirty="0">
+                <a:ln>
+                  <a:noFill/>
+                </a:ln>
+                <a:effectLst/>
+                <a:uLnTx/>
+                <a:uFillTx/>
+                <a:ea typeface="Arial Unicode MS" pitchFamily="34" charset="-128"/>
+                <a:cs typeface="Arial Unicode MS" pitchFamily="34" charset="-128"/>
+              </a:rPr>
+              <a:t>Service</a:t>
+            </a:r>
+          </a:p>
+        </p:txBody>
+      </p:sp>
+      <p:sp>
+        <p:nvSpPr>
+          <p:cNvPr id="10" name="Rectangle: Rounded Corners 9">
+            <a:extLst>
+              <a:ext uri="{FF2B5EF4-FFF2-40B4-BE49-F238E27FC236}">
+                <a16:creationId xmlns:a16="http://schemas.microsoft.com/office/drawing/2014/main" id="{F1B14316-48F2-4BE8-8E82-BCD907F26C80}"/>
+              </a:ext>
+            </a:extLst>
+          </p:cNvPr>
+          <p:cNvSpPr/>
+          <p:nvPr/>
+        </p:nvSpPr>
+        <p:spPr bwMode="gray">
+          <a:xfrm>
+            <a:off x="2482363" y="2511665"/>
+            <a:ext cx="1318846" cy="565639"/>
+          </a:xfrm>
+          <a:prstGeom prst="roundRect">
+            <a:avLst/>
+          </a:prstGeom>
+          <a:solidFill>
+            <a:srgbClr val="66CCFF"/>
+          </a:solidFill>
+          <a:ln w="12700" algn="ctr">
+            <a:solidFill>
+              <a:schemeClr val="bg1">
+                <a:lumMod val="75000"/>
+              </a:schemeClr>
+            </a:solidFill>
+            <a:miter lim="800000"/>
+            <a:headEnd/>
+            <a:tailEnd/>
+          </a:ln>
+        </p:spPr>
+        <p:txBody>
+          <a:bodyPr lIns="90000" tIns="72000" rIns="90000" bIns="72000" rtlCol="0" anchor="ctr"/>
+          <a:lstStyle/>
+          <a:p>
+            <a:pPr marR="0" algn="ctr" defTabSz="914400" eaLnBrk="1" fontAlgn="base" latinLnBrk="0" hangingPunct="1">
+              <a:lnSpc>
+                <a:spcPct val="100000"/>
+              </a:lnSpc>
+              <a:spcBef>
+                <a:spcPct val="50000"/>
+              </a:spcBef>
+              <a:spcAft>
+                <a:spcPct val="0"/>
+              </a:spcAft>
+              <a:buClr>
+                <a:srgbClr val="F0AB00"/>
+              </a:buClr>
+              <a:buSzPct val="80000"/>
+              <a:tabLst/>
+            </a:pPr>
+            <a:r>
+              <a:rPr kumimoji="0" lang="en-US" sz="1400" b="0" i="0" u="none" strike="noStrike" kern="0" cap="none" spc="0" normalizeH="0" baseline="0" noProof="0" dirty="0" err="1">
+                <a:ln>
+                  <a:noFill/>
+                </a:ln>
+                <a:effectLst/>
+                <a:uLnTx/>
+                <a:uFillTx/>
+                <a:ea typeface="Arial Unicode MS" pitchFamily="34" charset="-128"/>
+                <a:cs typeface="Arial Unicode MS" pitchFamily="34" charset="-128"/>
+              </a:rPr>
+              <a:t>Deamon</a:t>
+            </a:r>
+            <a:r>
+              <a:rPr lang="en-US" sz="1400" kern="0" dirty="0">
+                <a:ea typeface="Arial Unicode MS" pitchFamily="34" charset="-128"/>
+                <a:cs typeface="Arial Unicode MS" pitchFamily="34" charset="-128"/>
+              </a:rPr>
+              <a:t>Set</a:t>
+            </a:r>
+            <a:endParaRPr kumimoji="0" lang="en-US" sz="1400" b="0" i="0" u="none" strike="noStrike" kern="0" cap="none" spc="0" normalizeH="0" baseline="0" noProof="0" dirty="0">
+              <a:ln>
+                <a:noFill/>
+              </a:ln>
+              <a:effectLst/>
+              <a:uLnTx/>
+              <a:uFillTx/>
+              <a:ea typeface="Arial Unicode MS" pitchFamily="34" charset="-128"/>
+              <a:cs typeface="Arial Unicode MS" pitchFamily="34" charset="-128"/>
+            </a:endParaRPr>
+          </a:p>
+        </p:txBody>
+      </p:sp>
+      <p:sp>
+        <p:nvSpPr>
+          <p:cNvPr id="11" name="Rectangle: Rounded Corners 10">
+            <a:extLst>
+              <a:ext uri="{FF2B5EF4-FFF2-40B4-BE49-F238E27FC236}">
+                <a16:creationId xmlns:a16="http://schemas.microsoft.com/office/drawing/2014/main" id="{A5F93575-8C80-4A84-8621-89579DBAFC49}"/>
+              </a:ext>
+            </a:extLst>
+          </p:cNvPr>
+          <p:cNvSpPr/>
+          <p:nvPr/>
+        </p:nvSpPr>
+        <p:spPr bwMode="gray">
+          <a:xfrm>
+            <a:off x="4094286" y="2511664"/>
+            <a:ext cx="1318846" cy="565639"/>
+          </a:xfrm>
+          <a:prstGeom prst="roundRect">
+            <a:avLst/>
+          </a:prstGeom>
+          <a:solidFill>
+            <a:srgbClr val="66CCFF"/>
+          </a:solidFill>
+          <a:ln w="12700" algn="ctr">
+            <a:solidFill>
+              <a:schemeClr val="bg1">
+                <a:lumMod val="75000"/>
+              </a:schemeClr>
+            </a:solidFill>
+            <a:miter lim="800000"/>
+            <a:headEnd/>
+            <a:tailEnd/>
+          </a:ln>
+        </p:spPr>
+        <p:txBody>
+          <a:bodyPr lIns="90000" tIns="72000" rIns="90000" bIns="72000" rtlCol="0" anchor="ctr"/>
+          <a:lstStyle/>
+          <a:p>
+            <a:pPr marR="0" algn="ctr" defTabSz="914400" eaLnBrk="1" fontAlgn="base" latinLnBrk="0" hangingPunct="1">
+              <a:lnSpc>
+                <a:spcPct val="100000"/>
+              </a:lnSpc>
+              <a:spcBef>
+                <a:spcPct val="50000"/>
+              </a:spcBef>
+              <a:spcAft>
+                <a:spcPct val="0"/>
+              </a:spcAft>
+              <a:buClr>
+                <a:srgbClr val="F0AB00"/>
+              </a:buClr>
+              <a:buSzPct val="80000"/>
+              <a:tabLst/>
+            </a:pPr>
+            <a:r>
+              <a:rPr kumimoji="0" lang="en-US" sz="1400" b="0" i="0" u="none" strike="noStrike" kern="0" cap="none" spc="0" normalizeH="0" baseline="0" noProof="0" dirty="0">
+                <a:ln>
+                  <a:noFill/>
+                </a:ln>
+                <a:effectLst/>
+                <a:uLnTx/>
+                <a:uFillTx/>
+                <a:ea typeface="Arial Unicode MS" pitchFamily="34" charset="-128"/>
+                <a:cs typeface="Arial Unicode MS" pitchFamily="34" charset="-128"/>
+              </a:rPr>
+              <a:t>ReplicaSet</a:t>
+            </a:r>
+          </a:p>
+        </p:txBody>
+      </p:sp>
+      <p:sp>
+        <p:nvSpPr>
+          <p:cNvPr id="12" name="Rectangle: Rounded Corners 11">
+            <a:extLst>
+              <a:ext uri="{FF2B5EF4-FFF2-40B4-BE49-F238E27FC236}">
+                <a16:creationId xmlns:a16="http://schemas.microsoft.com/office/drawing/2014/main" id="{1190C6BF-8BEC-45E9-9F5E-D389A7A8D97D}"/>
+              </a:ext>
+            </a:extLst>
+          </p:cNvPr>
+          <p:cNvSpPr/>
+          <p:nvPr/>
+        </p:nvSpPr>
+        <p:spPr bwMode="gray">
+          <a:xfrm>
+            <a:off x="5681297" y="2511663"/>
+            <a:ext cx="1312497" cy="565639"/>
+          </a:xfrm>
+          <a:prstGeom prst="roundRect">
+            <a:avLst/>
+          </a:prstGeom>
+          <a:solidFill>
+            <a:srgbClr val="66CCFF"/>
+          </a:solidFill>
+          <a:ln w="12700" algn="ctr">
+            <a:solidFill>
+              <a:schemeClr val="bg1">
+                <a:lumMod val="75000"/>
+              </a:schemeClr>
+            </a:solidFill>
+            <a:miter lim="800000"/>
+            <a:headEnd/>
+            <a:tailEnd/>
+          </a:ln>
+        </p:spPr>
+        <p:txBody>
+          <a:bodyPr lIns="90000" tIns="72000" rIns="90000" bIns="72000" rtlCol="0" anchor="ctr"/>
+          <a:lstStyle/>
+          <a:p>
+            <a:pPr marR="0" algn="ctr" defTabSz="914400" eaLnBrk="1" fontAlgn="base" latinLnBrk="0" hangingPunct="1">
+              <a:lnSpc>
+                <a:spcPct val="100000"/>
+              </a:lnSpc>
+              <a:spcBef>
+                <a:spcPct val="50000"/>
+              </a:spcBef>
+              <a:spcAft>
+                <a:spcPct val="0"/>
+              </a:spcAft>
+              <a:buClr>
+                <a:srgbClr val="F0AB00"/>
+              </a:buClr>
+              <a:buSzPct val="80000"/>
+              <a:tabLst/>
+            </a:pPr>
+            <a:r>
+              <a:rPr kumimoji="0" lang="en-US" sz="1400" b="0" i="0" u="none" strike="noStrike" kern="0" cap="none" spc="0" normalizeH="0" baseline="0" noProof="0" dirty="0">
+                <a:ln>
+                  <a:noFill/>
+                </a:ln>
+                <a:effectLst/>
+                <a:uLnTx/>
+                <a:uFillTx/>
+                <a:ea typeface="Arial Unicode MS" pitchFamily="34" charset="-128"/>
+                <a:cs typeface="Arial Unicode MS" pitchFamily="34" charset="-128"/>
+              </a:rPr>
+              <a:t>StatefulSet</a:t>
+            </a:r>
+          </a:p>
+        </p:txBody>
+      </p:sp>
+      <p:sp>
+        <p:nvSpPr>
+          <p:cNvPr id="13" name="Rectangle: Rounded Corners 12">
+            <a:extLst>
+              <a:ext uri="{FF2B5EF4-FFF2-40B4-BE49-F238E27FC236}">
+                <a16:creationId xmlns:a16="http://schemas.microsoft.com/office/drawing/2014/main" id="{F054A698-E283-45D0-9DBC-B0DEB07BB77B}"/>
+              </a:ext>
+            </a:extLst>
+          </p:cNvPr>
+          <p:cNvSpPr/>
+          <p:nvPr/>
+        </p:nvSpPr>
+        <p:spPr bwMode="gray">
+          <a:xfrm>
+            <a:off x="4094287" y="1652939"/>
+            <a:ext cx="1318846" cy="565639"/>
+          </a:xfrm>
+          <a:prstGeom prst="roundRect">
+            <a:avLst/>
+          </a:prstGeom>
+          <a:solidFill>
+            <a:srgbClr val="66CCFF"/>
+          </a:solidFill>
+          <a:ln w="12700" algn="ctr">
+            <a:solidFill>
+              <a:schemeClr val="bg1">
+                <a:lumMod val="75000"/>
+              </a:schemeClr>
+            </a:solidFill>
+            <a:miter lim="800000"/>
+            <a:headEnd/>
+            <a:tailEnd/>
+          </a:ln>
+        </p:spPr>
+        <p:txBody>
+          <a:bodyPr lIns="90000" tIns="72000" rIns="90000" bIns="72000" rtlCol="0" anchor="ctr"/>
+          <a:lstStyle/>
+          <a:p>
+            <a:pPr marR="0" algn="ctr" defTabSz="914400" eaLnBrk="1" fontAlgn="base" latinLnBrk="0" hangingPunct="1">
+              <a:lnSpc>
+                <a:spcPct val="100000"/>
+              </a:lnSpc>
+              <a:spcBef>
+                <a:spcPct val="50000"/>
+              </a:spcBef>
+              <a:spcAft>
+                <a:spcPct val="0"/>
+              </a:spcAft>
+              <a:buClr>
+                <a:srgbClr val="F0AB00"/>
+              </a:buClr>
+              <a:buSzPct val="80000"/>
+              <a:tabLst/>
+            </a:pPr>
+            <a:r>
+              <a:rPr kumimoji="0" lang="en-US" sz="1400" b="0" i="0" u="none" strike="noStrike" kern="0" cap="none" spc="0" normalizeH="0" baseline="0" noProof="0" dirty="0">
+                <a:ln>
+                  <a:noFill/>
+                </a:ln>
+                <a:effectLst/>
+                <a:uLnTx/>
+                <a:uFillTx/>
+                <a:ea typeface="Arial Unicode MS" pitchFamily="34" charset="-128"/>
+                <a:cs typeface="Arial Unicode MS" pitchFamily="34" charset="-128"/>
+              </a:rPr>
+              <a:t>Deployment</a:t>
+            </a:r>
+          </a:p>
+        </p:txBody>
+      </p:sp>
+      <p:sp>
+        <p:nvSpPr>
+          <p:cNvPr id="14" name="Rectangle: Rounded Corners 13">
+            <a:extLst>
+              <a:ext uri="{FF2B5EF4-FFF2-40B4-BE49-F238E27FC236}">
+                <a16:creationId xmlns:a16="http://schemas.microsoft.com/office/drawing/2014/main" id="{F901D275-53F0-473D-8647-B5403AAD2628}"/>
+              </a:ext>
+            </a:extLst>
+          </p:cNvPr>
+          <p:cNvSpPr/>
+          <p:nvPr/>
+        </p:nvSpPr>
+        <p:spPr bwMode="gray">
+          <a:xfrm>
+            <a:off x="7213862" y="2523383"/>
+            <a:ext cx="1318846" cy="565639"/>
+          </a:xfrm>
+          <a:prstGeom prst="roundRect">
+            <a:avLst/>
+          </a:prstGeom>
+          <a:solidFill>
+            <a:srgbClr val="66CCFF"/>
+          </a:solidFill>
+          <a:ln w="12700" algn="ctr">
+            <a:solidFill>
+              <a:schemeClr val="bg1">
+                <a:lumMod val="75000"/>
+              </a:schemeClr>
+            </a:solidFill>
+            <a:miter lim="800000"/>
+            <a:headEnd/>
+            <a:tailEnd/>
+          </a:ln>
+        </p:spPr>
+        <p:txBody>
+          <a:bodyPr lIns="90000" tIns="72000" rIns="90000" bIns="72000" rtlCol="0" anchor="ctr"/>
+          <a:lstStyle/>
+          <a:p>
+            <a:pPr marR="0" algn="ctr" defTabSz="914400" eaLnBrk="1" fontAlgn="base" latinLnBrk="0" hangingPunct="1">
+              <a:lnSpc>
+                <a:spcPct val="100000"/>
+              </a:lnSpc>
+              <a:spcBef>
+                <a:spcPct val="50000"/>
+              </a:spcBef>
+              <a:spcAft>
+                <a:spcPct val="0"/>
+              </a:spcAft>
+              <a:buClr>
+                <a:srgbClr val="F0AB00"/>
+              </a:buClr>
+              <a:buSzPct val="80000"/>
+              <a:tabLst/>
+            </a:pPr>
+            <a:r>
+              <a:rPr kumimoji="0" lang="en-US" sz="1400" b="0" i="0" u="none" strike="noStrike" kern="0" cap="none" spc="0" normalizeH="0" baseline="0" noProof="0" dirty="0">
+                <a:ln>
+                  <a:noFill/>
+                </a:ln>
+                <a:effectLst/>
+                <a:uLnTx/>
+                <a:uFillTx/>
+                <a:ea typeface="Arial Unicode MS" pitchFamily="34" charset="-128"/>
+                <a:cs typeface="Arial Unicode MS" pitchFamily="34" charset="-128"/>
+              </a:rPr>
+              <a:t>Job</a:t>
+            </a:r>
+          </a:p>
+        </p:txBody>
+      </p:sp>
+      <p:sp>
+        <p:nvSpPr>
+          <p:cNvPr id="15" name="Rectangle: Rounded Corners 14">
+            <a:extLst>
+              <a:ext uri="{FF2B5EF4-FFF2-40B4-BE49-F238E27FC236}">
+                <a16:creationId xmlns:a16="http://schemas.microsoft.com/office/drawing/2014/main" id="{90497154-E19F-4FBF-B9C5-44FB8B37AC50}"/>
+              </a:ext>
+            </a:extLst>
+          </p:cNvPr>
+          <p:cNvSpPr/>
+          <p:nvPr/>
+        </p:nvSpPr>
+        <p:spPr bwMode="gray">
+          <a:xfrm>
+            <a:off x="7218484" y="1652938"/>
+            <a:ext cx="1314224" cy="565639"/>
+          </a:xfrm>
+          <a:prstGeom prst="roundRect">
+            <a:avLst/>
+          </a:prstGeom>
+          <a:solidFill>
+            <a:srgbClr val="66CCFF"/>
+          </a:solidFill>
+          <a:ln w="12700" algn="ctr">
+            <a:solidFill>
+              <a:schemeClr val="bg1">
+                <a:lumMod val="75000"/>
+              </a:schemeClr>
+            </a:solidFill>
+            <a:miter lim="800000"/>
+            <a:headEnd/>
+            <a:tailEnd/>
+          </a:ln>
+        </p:spPr>
+        <p:txBody>
+          <a:bodyPr lIns="90000" tIns="72000" rIns="90000" bIns="72000" rtlCol="0" anchor="ctr"/>
+          <a:lstStyle/>
+          <a:p>
+            <a:pPr marR="0" algn="ctr" defTabSz="914400" eaLnBrk="1" fontAlgn="base" latinLnBrk="0" hangingPunct="1">
+              <a:lnSpc>
+                <a:spcPct val="100000"/>
+              </a:lnSpc>
+              <a:spcBef>
+                <a:spcPct val="50000"/>
+              </a:spcBef>
+              <a:spcAft>
+                <a:spcPct val="0"/>
+              </a:spcAft>
+              <a:buClr>
+                <a:srgbClr val="F0AB00"/>
+              </a:buClr>
+              <a:buSzPct val="80000"/>
+              <a:tabLst/>
+            </a:pPr>
+            <a:r>
+              <a:rPr kumimoji="0" lang="en-US" sz="1400" b="0" i="0" u="none" strike="noStrike" kern="0" cap="none" spc="0" normalizeH="0" baseline="0" noProof="0" dirty="0" err="1">
+                <a:ln>
+                  <a:noFill/>
+                </a:ln>
+                <a:effectLst/>
+                <a:uLnTx/>
+                <a:uFillTx/>
+                <a:ea typeface="Arial Unicode MS" pitchFamily="34" charset="-128"/>
+                <a:cs typeface="Arial Unicode MS" pitchFamily="34" charset="-128"/>
+              </a:rPr>
+              <a:t>CronJob</a:t>
+            </a:r>
+            <a:endParaRPr kumimoji="0" lang="en-US" sz="1400" b="0" i="0" u="none" strike="noStrike" kern="0" cap="none" spc="0" normalizeH="0" baseline="0" noProof="0" dirty="0">
+              <a:ln>
+                <a:noFill/>
+              </a:ln>
+              <a:effectLst/>
+              <a:uLnTx/>
+              <a:uFillTx/>
+              <a:ea typeface="Arial Unicode MS" pitchFamily="34" charset="-128"/>
+              <a:cs typeface="Arial Unicode MS" pitchFamily="34" charset="-128"/>
+            </a:endParaRPr>
+          </a:p>
+        </p:txBody>
+      </p:sp>
+      <p:sp>
+        <p:nvSpPr>
+          <p:cNvPr id="16" name="Rectangle: Rounded Corners 15">
+            <a:extLst>
+              <a:ext uri="{FF2B5EF4-FFF2-40B4-BE49-F238E27FC236}">
+                <a16:creationId xmlns:a16="http://schemas.microsoft.com/office/drawing/2014/main" id="{B90585D6-702C-4C90-9EE2-09A6D605BB70}"/>
+              </a:ext>
+            </a:extLst>
+          </p:cNvPr>
+          <p:cNvSpPr/>
+          <p:nvPr/>
+        </p:nvSpPr>
+        <p:spPr bwMode="gray">
+          <a:xfrm>
+            <a:off x="864582" y="4451820"/>
+            <a:ext cx="1318846" cy="565639"/>
+          </a:xfrm>
+          <a:prstGeom prst="roundRect">
+            <a:avLst/>
+          </a:prstGeom>
+          <a:solidFill>
+            <a:srgbClr val="66CCFF"/>
+          </a:solidFill>
+          <a:ln w="12700" algn="ctr">
+            <a:solidFill>
+              <a:schemeClr val="bg1">
+                <a:lumMod val="75000"/>
+              </a:schemeClr>
+            </a:solidFill>
+            <a:miter lim="800000"/>
+            <a:headEnd/>
+            <a:tailEnd/>
+          </a:ln>
+        </p:spPr>
+        <p:txBody>
+          <a:bodyPr lIns="90000" tIns="72000" rIns="90000" bIns="72000" rtlCol="0" anchor="ctr"/>
+          <a:lstStyle/>
+          <a:p>
+            <a:pPr marR="0" algn="ctr" defTabSz="914400" eaLnBrk="1" fontAlgn="base" latinLnBrk="0" hangingPunct="1">
+              <a:lnSpc>
+                <a:spcPct val="100000"/>
+              </a:lnSpc>
+              <a:spcBef>
+                <a:spcPct val="50000"/>
+              </a:spcBef>
+              <a:spcAft>
+                <a:spcPct val="0"/>
+              </a:spcAft>
+              <a:buClr>
+                <a:srgbClr val="F0AB00"/>
+              </a:buClr>
+              <a:buSzPct val="80000"/>
+              <a:tabLst/>
+            </a:pPr>
+            <a:r>
+              <a:rPr kumimoji="0" lang="en-US" sz="1400" b="0" i="0" u="none" strike="noStrike" kern="0" cap="none" spc="0" normalizeH="0" baseline="0" noProof="0" dirty="0">
+                <a:ln>
+                  <a:noFill/>
+                </a:ln>
+                <a:effectLst/>
+                <a:uLnTx/>
+                <a:uFillTx/>
+                <a:ea typeface="Arial Unicode MS" pitchFamily="34" charset="-128"/>
+                <a:cs typeface="Arial Unicode MS" pitchFamily="34" charset="-128"/>
+              </a:rPr>
+              <a:t>Ingress</a:t>
+            </a:r>
+          </a:p>
+        </p:txBody>
+      </p:sp>
+      <p:sp>
+        <p:nvSpPr>
+          <p:cNvPr id="17" name="Rectangle: Rounded Corners 16">
+            <a:extLst>
+              <a:ext uri="{FF2B5EF4-FFF2-40B4-BE49-F238E27FC236}">
+                <a16:creationId xmlns:a16="http://schemas.microsoft.com/office/drawing/2014/main" id="{06E5FC6B-176C-4286-9988-551AA1CD1131}"/>
+              </a:ext>
+            </a:extLst>
+          </p:cNvPr>
+          <p:cNvSpPr/>
+          <p:nvPr/>
+        </p:nvSpPr>
+        <p:spPr bwMode="gray">
+          <a:xfrm>
+            <a:off x="5681297" y="5218237"/>
+            <a:ext cx="1318846" cy="565639"/>
+          </a:xfrm>
+          <a:prstGeom prst="roundRect">
+            <a:avLst/>
+          </a:prstGeom>
+          <a:solidFill>
+            <a:srgbClr val="66CCFF"/>
+          </a:solidFill>
+          <a:ln w="12700" algn="ctr">
+            <a:solidFill>
+              <a:schemeClr val="bg1">
+                <a:lumMod val="75000"/>
+              </a:schemeClr>
+            </a:solidFill>
+            <a:miter lim="800000"/>
+            <a:headEnd/>
+            <a:tailEnd/>
+          </a:ln>
+        </p:spPr>
+        <p:txBody>
+          <a:bodyPr lIns="90000" tIns="72000" rIns="90000" bIns="72000" rtlCol="0" anchor="ctr"/>
+          <a:lstStyle/>
+          <a:p>
+            <a:pPr marR="0" algn="ctr" defTabSz="914400" eaLnBrk="1" fontAlgn="base" latinLnBrk="0" hangingPunct="1">
+              <a:lnSpc>
+                <a:spcPct val="100000"/>
+              </a:lnSpc>
+              <a:spcBef>
+                <a:spcPct val="50000"/>
+              </a:spcBef>
+              <a:spcAft>
+                <a:spcPct val="0"/>
+              </a:spcAft>
+              <a:buClr>
+                <a:srgbClr val="F0AB00"/>
+              </a:buClr>
+              <a:buSzPct val="80000"/>
+              <a:tabLst/>
+            </a:pPr>
+            <a:r>
+              <a:rPr kumimoji="0" lang="en-US" sz="1400" b="0" i="0" u="none" strike="noStrike" kern="0" cap="none" spc="0" normalizeH="0" baseline="0" noProof="0" dirty="0">
+                <a:ln>
+                  <a:noFill/>
+                </a:ln>
+                <a:effectLst/>
+                <a:uLnTx/>
+                <a:uFillTx/>
+                <a:ea typeface="Arial Unicode MS" pitchFamily="34" charset="-128"/>
+                <a:cs typeface="Arial Unicode MS" pitchFamily="34" charset="-128"/>
+              </a:rPr>
+              <a:t>Volume</a:t>
+            </a:r>
+          </a:p>
+        </p:txBody>
+      </p:sp>
+      <p:sp>
+        <p:nvSpPr>
+          <p:cNvPr id="18" name="Rectangle: Rounded Corners 17">
+            <a:extLst>
+              <a:ext uri="{FF2B5EF4-FFF2-40B4-BE49-F238E27FC236}">
+                <a16:creationId xmlns:a16="http://schemas.microsoft.com/office/drawing/2014/main" id="{515D0D19-C98C-4464-AA29-34A29FD81DDE}"/>
+              </a:ext>
+            </a:extLst>
+          </p:cNvPr>
+          <p:cNvSpPr/>
+          <p:nvPr/>
+        </p:nvSpPr>
+        <p:spPr bwMode="gray">
+          <a:xfrm>
+            <a:off x="4201214" y="5942135"/>
+            <a:ext cx="1318846" cy="565639"/>
+          </a:xfrm>
+          <a:prstGeom prst="roundRect">
+            <a:avLst/>
+          </a:prstGeom>
+          <a:solidFill>
+            <a:srgbClr val="66CCFF"/>
+          </a:solidFill>
+          <a:ln w="12700" algn="ctr">
+            <a:solidFill>
+              <a:schemeClr val="bg1">
+                <a:lumMod val="75000"/>
+              </a:schemeClr>
+            </a:solidFill>
+            <a:miter lim="800000"/>
+            <a:headEnd/>
+            <a:tailEnd/>
+          </a:ln>
+        </p:spPr>
+        <p:txBody>
+          <a:bodyPr lIns="90000" tIns="72000" rIns="90000" bIns="72000" rtlCol="0" anchor="ctr"/>
+          <a:lstStyle/>
+          <a:p>
+            <a:pPr marR="0" algn="ctr" defTabSz="914400" eaLnBrk="1" fontAlgn="base" latinLnBrk="0" hangingPunct="1">
+              <a:lnSpc>
+                <a:spcPct val="100000"/>
+              </a:lnSpc>
+              <a:spcBef>
+                <a:spcPct val="50000"/>
+              </a:spcBef>
+              <a:spcAft>
+                <a:spcPct val="0"/>
+              </a:spcAft>
+              <a:buClr>
+                <a:srgbClr val="F0AB00"/>
+              </a:buClr>
+              <a:buSzPct val="80000"/>
+              <a:tabLst/>
+            </a:pPr>
+            <a:r>
+              <a:rPr kumimoji="0" lang="en-US" sz="1400" b="0" i="0" u="none" strike="noStrike" kern="0" cap="none" spc="0" normalizeH="0" baseline="0" noProof="0" dirty="0" err="1">
+                <a:ln>
+                  <a:noFill/>
+                </a:ln>
+                <a:effectLst/>
+                <a:uLnTx/>
+                <a:uFillTx/>
+                <a:ea typeface="Arial Unicode MS" pitchFamily="34" charset="-128"/>
+                <a:cs typeface="Arial Unicode MS" pitchFamily="34" charset="-128"/>
+              </a:rPr>
+              <a:t>ConfigMap</a:t>
+            </a:r>
+            <a:endParaRPr kumimoji="0" lang="en-US" sz="1400" b="0" i="0" u="none" strike="noStrike" kern="0" cap="none" spc="0" normalizeH="0" baseline="0" noProof="0" dirty="0">
+              <a:ln>
+                <a:noFill/>
+              </a:ln>
+              <a:effectLst/>
+              <a:uLnTx/>
+              <a:uFillTx/>
+              <a:ea typeface="Arial Unicode MS" pitchFamily="34" charset="-128"/>
+              <a:cs typeface="Arial Unicode MS" pitchFamily="34" charset="-128"/>
+            </a:endParaRPr>
+          </a:p>
+        </p:txBody>
+      </p:sp>
+      <p:sp>
+        <p:nvSpPr>
+          <p:cNvPr id="19" name="Rectangle: Rounded Corners 18">
+            <a:extLst>
+              <a:ext uri="{FF2B5EF4-FFF2-40B4-BE49-F238E27FC236}">
+                <a16:creationId xmlns:a16="http://schemas.microsoft.com/office/drawing/2014/main" id="{B2BA1BE5-A23E-4904-B5C9-3108D1C2DBC3}"/>
+              </a:ext>
+            </a:extLst>
+          </p:cNvPr>
+          <p:cNvSpPr/>
+          <p:nvPr/>
+        </p:nvSpPr>
+        <p:spPr bwMode="gray">
+          <a:xfrm>
+            <a:off x="5678125" y="5942136"/>
+            <a:ext cx="1315670" cy="565639"/>
+          </a:xfrm>
+          <a:prstGeom prst="roundRect">
+            <a:avLst/>
+          </a:prstGeom>
+          <a:solidFill>
+            <a:srgbClr val="66CCFF"/>
+          </a:solidFill>
+          <a:ln w="12700" algn="ctr">
+            <a:solidFill>
+              <a:schemeClr val="bg1">
+                <a:lumMod val="75000"/>
+              </a:schemeClr>
+            </a:solidFill>
+            <a:miter lim="800000"/>
+            <a:headEnd/>
+            <a:tailEnd/>
+          </a:ln>
+        </p:spPr>
+        <p:txBody>
+          <a:bodyPr lIns="90000" tIns="72000" rIns="90000" bIns="72000" rtlCol="0" anchor="ctr"/>
+          <a:lstStyle/>
+          <a:p>
+            <a:pPr marR="0" algn="ctr" defTabSz="914400" eaLnBrk="1" fontAlgn="base" latinLnBrk="0" hangingPunct="1">
+              <a:lnSpc>
+                <a:spcPct val="100000"/>
+              </a:lnSpc>
+              <a:spcBef>
+                <a:spcPct val="50000"/>
+              </a:spcBef>
+              <a:spcAft>
+                <a:spcPct val="0"/>
+              </a:spcAft>
+              <a:buClr>
+                <a:srgbClr val="F0AB00"/>
+              </a:buClr>
+              <a:buSzPct val="80000"/>
+              <a:tabLst/>
+            </a:pPr>
+            <a:r>
+              <a:rPr kumimoji="0" lang="en-US" sz="1400" b="0" i="0" u="none" strike="noStrike" kern="0" cap="none" spc="0" normalizeH="0" baseline="0" noProof="0" dirty="0">
+                <a:ln>
+                  <a:noFill/>
+                </a:ln>
+                <a:effectLst/>
+                <a:uLnTx/>
+                <a:uFillTx/>
+                <a:ea typeface="Arial Unicode MS" pitchFamily="34" charset="-128"/>
+                <a:cs typeface="Arial Unicode MS" pitchFamily="34" charset="-128"/>
+              </a:rPr>
+              <a:t>Persistent</a:t>
+            </a:r>
+            <a:br>
+              <a:rPr kumimoji="0" lang="en-US" sz="1400" b="0" i="0" u="none" strike="noStrike" kern="0" cap="none" spc="0" normalizeH="0" baseline="0" noProof="0" dirty="0">
+                <a:ln>
+                  <a:noFill/>
+                </a:ln>
+                <a:effectLst/>
+                <a:uLnTx/>
+                <a:uFillTx/>
+                <a:ea typeface="Arial Unicode MS" pitchFamily="34" charset="-128"/>
+                <a:cs typeface="Arial Unicode MS" pitchFamily="34" charset="-128"/>
+              </a:rPr>
+            </a:br>
+            <a:r>
+              <a:rPr kumimoji="0" lang="en-US" sz="1400" b="0" i="0" u="none" strike="noStrike" kern="0" cap="none" spc="0" normalizeH="0" baseline="0" noProof="0" dirty="0" err="1">
+                <a:ln>
+                  <a:noFill/>
+                </a:ln>
+                <a:effectLst/>
+                <a:uLnTx/>
+                <a:uFillTx/>
+                <a:ea typeface="Arial Unicode MS" pitchFamily="34" charset="-128"/>
+                <a:cs typeface="Arial Unicode MS" pitchFamily="34" charset="-128"/>
+              </a:rPr>
+              <a:t>VolumeClaim</a:t>
+            </a:r>
+            <a:endParaRPr kumimoji="0" lang="en-US" sz="1400" b="0" i="0" u="none" strike="noStrike" kern="0" cap="none" spc="0" normalizeH="0" baseline="0" noProof="0" dirty="0">
+              <a:ln>
+                <a:noFill/>
+              </a:ln>
+              <a:effectLst/>
+              <a:uLnTx/>
+              <a:uFillTx/>
+              <a:ea typeface="Arial Unicode MS" pitchFamily="34" charset="-128"/>
+              <a:cs typeface="Arial Unicode MS" pitchFamily="34" charset="-128"/>
+            </a:endParaRPr>
+          </a:p>
+        </p:txBody>
+      </p:sp>
+      <p:sp>
+        <p:nvSpPr>
+          <p:cNvPr id="20" name="Rectangle: Rounded Corners 19">
+            <a:extLst>
+              <a:ext uri="{FF2B5EF4-FFF2-40B4-BE49-F238E27FC236}">
+                <a16:creationId xmlns:a16="http://schemas.microsoft.com/office/drawing/2014/main" id="{BF28B790-D3D9-49BA-97B5-0204FDADBC2C}"/>
+              </a:ext>
+            </a:extLst>
+          </p:cNvPr>
+          <p:cNvSpPr/>
+          <p:nvPr/>
+        </p:nvSpPr>
+        <p:spPr bwMode="gray">
+          <a:xfrm>
+            <a:off x="7161380" y="5942135"/>
+            <a:ext cx="1318846" cy="565639"/>
+          </a:xfrm>
+          <a:prstGeom prst="roundRect">
+            <a:avLst/>
+          </a:prstGeom>
+          <a:solidFill>
+            <a:srgbClr val="66CCFF"/>
+          </a:solidFill>
+          <a:ln w="12700" algn="ctr">
+            <a:solidFill>
+              <a:schemeClr val="bg1">
+                <a:lumMod val="75000"/>
+              </a:schemeClr>
+            </a:solidFill>
+            <a:miter lim="800000"/>
+            <a:headEnd/>
+            <a:tailEnd/>
+          </a:ln>
+        </p:spPr>
+        <p:txBody>
+          <a:bodyPr lIns="90000" tIns="72000" rIns="90000" bIns="72000" rtlCol="0" anchor="ctr"/>
+          <a:lstStyle/>
+          <a:p>
+            <a:pPr marR="0" algn="ctr" defTabSz="914400" eaLnBrk="1" fontAlgn="base" latinLnBrk="0" hangingPunct="1">
+              <a:lnSpc>
+                <a:spcPct val="100000"/>
+              </a:lnSpc>
+              <a:spcBef>
+                <a:spcPct val="50000"/>
+              </a:spcBef>
+              <a:spcAft>
+                <a:spcPct val="0"/>
+              </a:spcAft>
+              <a:buClr>
+                <a:srgbClr val="F0AB00"/>
+              </a:buClr>
+              <a:buSzPct val="80000"/>
+              <a:tabLst/>
+            </a:pPr>
+            <a:r>
+              <a:rPr kumimoji="0" lang="en-US" sz="1400" b="0" i="0" u="none" strike="noStrike" kern="0" cap="none" spc="0" normalizeH="0" baseline="0" noProof="0" dirty="0">
+                <a:ln>
+                  <a:noFill/>
+                </a:ln>
+                <a:effectLst/>
+                <a:uLnTx/>
+                <a:uFillTx/>
+                <a:ea typeface="Arial Unicode MS" pitchFamily="34" charset="-128"/>
+                <a:cs typeface="Arial Unicode MS" pitchFamily="34" charset="-128"/>
+              </a:rPr>
+              <a:t>Secret</a:t>
+            </a:r>
+          </a:p>
+        </p:txBody>
+      </p:sp>
+      <p:cxnSp>
+        <p:nvCxnSpPr>
+          <p:cNvPr id="4" name="Connector: Elbow 3">
+            <a:extLst>
+              <a:ext uri="{FF2B5EF4-FFF2-40B4-BE49-F238E27FC236}">
+                <a16:creationId xmlns:a16="http://schemas.microsoft.com/office/drawing/2014/main" id="{56C7156A-7B2E-414B-94E1-4179D55DBE39}"/>
+              </a:ext>
+            </a:extLst>
+          </p:cNvPr>
+          <p:cNvCxnSpPr>
+            <a:stCxn id="11" idx="2"/>
+          </p:cNvCxnSpPr>
+          <p:nvPr/>
+        </p:nvCxnSpPr>
+        <p:spPr>
+          <a:xfrm rot="16200000" flipH="1">
+            <a:off x="4958128" y="2872884"/>
+            <a:ext cx="518751" cy="927588"/>
+          </a:xfrm>
+          <a:prstGeom prst="bentConnector2">
+            <a:avLst/>
+          </a:prstGeom>
+          <a:ln w="25400">
+            <a:solidFill>
+              <a:schemeClr val="tx1"/>
+            </a:solidFill>
+            <a:headEnd type="none" w="med" len="med"/>
+            <a:tailEnd type="triangle"/>
+          </a:ln>
+        </p:spPr>
+        <p:style>
+          <a:lnRef idx="1">
+            <a:schemeClr val="accent1"/>
+          </a:lnRef>
+          <a:fillRef idx="0">
+            <a:schemeClr val="accent1"/>
+          </a:fillRef>
+          <a:effectRef idx="0">
+            <a:schemeClr val="accent1"/>
+          </a:effectRef>
+          <a:fontRef idx="minor">
+            <a:schemeClr val="tx1"/>
+          </a:fontRef>
+        </p:style>
+      </p:cxnSp>
+      <p:cxnSp>
+        <p:nvCxnSpPr>
+          <p:cNvPr id="21" name="Connector: Elbow 20">
+            <a:extLst>
+              <a:ext uri="{FF2B5EF4-FFF2-40B4-BE49-F238E27FC236}">
+                <a16:creationId xmlns:a16="http://schemas.microsoft.com/office/drawing/2014/main" id="{BD2D0A0B-967B-4A2D-9C80-2C02B1B9A037}"/>
+              </a:ext>
+            </a:extLst>
+          </p:cNvPr>
+          <p:cNvCxnSpPr>
+            <a:cxnSpLocks/>
+            <a:stCxn id="13" idx="2"/>
+            <a:endCxn id="11" idx="0"/>
+          </p:cNvCxnSpPr>
+          <p:nvPr/>
+        </p:nvCxnSpPr>
+        <p:spPr>
+          <a:xfrm rot="5400000">
+            <a:off x="4607167" y="2365121"/>
+            <a:ext cx="293086" cy="1"/>
+          </a:xfrm>
+          <a:prstGeom prst="bentConnector3">
+            <a:avLst/>
+          </a:prstGeom>
+          <a:ln w="25400">
+            <a:solidFill>
+              <a:schemeClr val="tx1"/>
+            </a:solidFill>
+            <a:headEnd type="none" w="med" len="med"/>
+            <a:tailEnd type="triangle"/>
+          </a:ln>
+        </p:spPr>
+        <p:style>
+          <a:lnRef idx="1">
+            <a:schemeClr val="accent1"/>
+          </a:lnRef>
+          <a:fillRef idx="0">
+            <a:schemeClr val="accent1"/>
+          </a:fillRef>
+          <a:effectRef idx="0">
+            <a:schemeClr val="accent1"/>
+          </a:effectRef>
+          <a:fontRef idx="minor">
+            <a:schemeClr val="tx1"/>
+          </a:fontRef>
+        </p:style>
+      </p:cxnSp>
+      <p:cxnSp>
+        <p:nvCxnSpPr>
+          <p:cNvPr id="23" name="Connector: Elbow 22">
+            <a:extLst>
+              <a:ext uri="{FF2B5EF4-FFF2-40B4-BE49-F238E27FC236}">
+                <a16:creationId xmlns:a16="http://schemas.microsoft.com/office/drawing/2014/main" id="{B6B56E7C-8874-441E-AB5B-2CA3CCAD5526}"/>
+              </a:ext>
+            </a:extLst>
+          </p:cNvPr>
+          <p:cNvCxnSpPr>
+            <a:cxnSpLocks/>
+            <a:stCxn id="15" idx="2"/>
+            <a:endCxn id="14" idx="0"/>
+          </p:cNvCxnSpPr>
+          <p:nvPr/>
+        </p:nvCxnSpPr>
+        <p:spPr>
+          <a:xfrm rot="5400000">
+            <a:off x="7722038" y="2369825"/>
+            <a:ext cx="304806" cy="2311"/>
+          </a:xfrm>
+          <a:prstGeom prst="bentConnector3">
+            <a:avLst/>
+          </a:prstGeom>
+          <a:ln w="25400">
+            <a:solidFill>
+              <a:schemeClr val="tx1"/>
+            </a:solidFill>
+            <a:headEnd type="none" w="med" len="med"/>
+            <a:tailEnd type="triangle"/>
+          </a:ln>
+        </p:spPr>
+        <p:style>
+          <a:lnRef idx="1">
+            <a:schemeClr val="accent1"/>
+          </a:lnRef>
+          <a:fillRef idx="0">
+            <a:schemeClr val="accent1"/>
+          </a:fillRef>
+          <a:effectRef idx="0">
+            <a:schemeClr val="accent1"/>
+          </a:effectRef>
+          <a:fontRef idx="minor">
+            <a:schemeClr val="tx1"/>
+          </a:fontRef>
+        </p:style>
+      </p:cxnSp>
+      <p:cxnSp>
+        <p:nvCxnSpPr>
+          <p:cNvPr id="25" name="Connector: Elbow 24">
+            <a:extLst>
+              <a:ext uri="{FF2B5EF4-FFF2-40B4-BE49-F238E27FC236}">
+                <a16:creationId xmlns:a16="http://schemas.microsoft.com/office/drawing/2014/main" id="{A5CB6BD5-DA26-46A6-815D-DC8790BED9E7}"/>
+              </a:ext>
+            </a:extLst>
+          </p:cNvPr>
+          <p:cNvCxnSpPr>
+            <a:stCxn id="14" idx="2"/>
+          </p:cNvCxnSpPr>
+          <p:nvPr/>
+        </p:nvCxnSpPr>
+        <p:spPr>
+          <a:xfrm rot="5400000">
+            <a:off x="7180024" y="2902793"/>
+            <a:ext cx="507032" cy="879491"/>
+          </a:xfrm>
+          <a:prstGeom prst="bentConnector2">
+            <a:avLst/>
+          </a:prstGeom>
+          <a:ln w="25400">
+            <a:solidFill>
+              <a:schemeClr val="tx1"/>
+            </a:solidFill>
+            <a:headEnd type="none" w="med" len="med"/>
+            <a:tailEnd type="triangle"/>
+          </a:ln>
+        </p:spPr>
+        <p:style>
+          <a:lnRef idx="1">
+            <a:schemeClr val="accent1"/>
+          </a:lnRef>
+          <a:fillRef idx="0">
+            <a:schemeClr val="accent1"/>
+          </a:fillRef>
+          <a:effectRef idx="0">
+            <a:schemeClr val="accent1"/>
+          </a:effectRef>
+          <a:fontRef idx="minor">
+            <a:schemeClr val="tx1"/>
+          </a:fontRef>
+        </p:style>
+      </p:cxnSp>
+      <p:cxnSp>
+        <p:nvCxnSpPr>
+          <p:cNvPr id="27" name="Connector: Elbow 26">
+            <a:extLst>
+              <a:ext uri="{FF2B5EF4-FFF2-40B4-BE49-F238E27FC236}">
+                <a16:creationId xmlns:a16="http://schemas.microsoft.com/office/drawing/2014/main" id="{4504B454-54FB-467C-A461-76D43D7E3E82}"/>
+              </a:ext>
+            </a:extLst>
+          </p:cNvPr>
+          <p:cNvCxnSpPr>
+            <a:cxnSpLocks/>
+            <a:stCxn id="12" idx="2"/>
+            <a:endCxn id="8" idx="0"/>
+          </p:cNvCxnSpPr>
+          <p:nvPr/>
+        </p:nvCxnSpPr>
+        <p:spPr>
+          <a:xfrm rot="16200000" flipH="1">
+            <a:off x="6180870" y="3233978"/>
+            <a:ext cx="316526" cy="3174"/>
+          </a:xfrm>
+          <a:prstGeom prst="bentConnector3">
+            <a:avLst/>
+          </a:prstGeom>
+          <a:ln w="25400">
+            <a:solidFill>
+              <a:schemeClr val="tx1"/>
+            </a:solidFill>
+            <a:headEnd type="none" w="med" len="med"/>
+            <a:tailEnd type="triangle"/>
+          </a:ln>
+        </p:spPr>
+        <p:style>
+          <a:lnRef idx="1">
+            <a:schemeClr val="accent1"/>
+          </a:lnRef>
+          <a:fillRef idx="0">
+            <a:schemeClr val="accent1"/>
+          </a:fillRef>
+          <a:effectRef idx="0">
+            <a:schemeClr val="accent1"/>
+          </a:effectRef>
+          <a:fontRef idx="minor">
+            <a:schemeClr val="tx1"/>
+          </a:fontRef>
+        </p:style>
+      </p:cxnSp>
+      <p:cxnSp>
+        <p:nvCxnSpPr>
+          <p:cNvPr id="37" name="Connector: Elbow 36">
+            <a:extLst>
+              <a:ext uri="{FF2B5EF4-FFF2-40B4-BE49-F238E27FC236}">
+                <a16:creationId xmlns:a16="http://schemas.microsoft.com/office/drawing/2014/main" id="{70989806-32E3-4EEA-A5CE-63FB8653B19E}"/>
+              </a:ext>
+            </a:extLst>
+          </p:cNvPr>
+          <p:cNvCxnSpPr>
+            <a:stCxn id="10" idx="2"/>
+            <a:endCxn id="8" idx="1"/>
+          </p:cNvCxnSpPr>
+          <p:nvPr/>
+        </p:nvCxnSpPr>
+        <p:spPr>
+          <a:xfrm rot="16200000" flipH="1">
+            <a:off x="4031272" y="2187817"/>
+            <a:ext cx="760539" cy="2539511"/>
+          </a:xfrm>
+          <a:prstGeom prst="bentConnector2">
+            <a:avLst/>
+          </a:prstGeom>
+          <a:ln w="25400">
+            <a:solidFill>
+              <a:schemeClr val="tx1"/>
+            </a:solidFill>
+            <a:headEnd type="none" w="med" len="med"/>
+            <a:tailEnd type="triangle"/>
+          </a:ln>
+        </p:spPr>
+        <p:style>
+          <a:lnRef idx="1">
+            <a:schemeClr val="accent1"/>
+          </a:lnRef>
+          <a:fillRef idx="0">
+            <a:schemeClr val="accent1"/>
+          </a:fillRef>
+          <a:effectRef idx="0">
+            <a:schemeClr val="accent1"/>
+          </a:effectRef>
+          <a:fontRef idx="minor">
+            <a:schemeClr val="tx1"/>
+          </a:fontRef>
+        </p:style>
+      </p:cxnSp>
+      <p:cxnSp>
+        <p:nvCxnSpPr>
+          <p:cNvPr id="39" name="Connector: Elbow 38">
+            <a:extLst>
+              <a:ext uri="{FF2B5EF4-FFF2-40B4-BE49-F238E27FC236}">
+                <a16:creationId xmlns:a16="http://schemas.microsoft.com/office/drawing/2014/main" id="{70B66DCA-4DAF-4079-89EC-6FB7BEE2F6DC}"/>
+              </a:ext>
+            </a:extLst>
+          </p:cNvPr>
+          <p:cNvCxnSpPr>
+            <a:cxnSpLocks/>
+          </p:cNvCxnSpPr>
+          <p:nvPr/>
+        </p:nvCxnSpPr>
+        <p:spPr>
+          <a:xfrm rot="5400000" flipH="1" flipV="1">
+            <a:off x="5033475" y="3762478"/>
+            <a:ext cx="392726" cy="952257"/>
+          </a:xfrm>
+          <a:prstGeom prst="bentConnector2">
+            <a:avLst/>
+          </a:prstGeom>
+          <a:ln w="25400">
+            <a:solidFill>
+              <a:schemeClr val="tx1"/>
+            </a:solidFill>
+            <a:headEnd type="none" w="med" len="med"/>
+            <a:tailEnd type="triangle"/>
+          </a:ln>
+        </p:spPr>
+        <p:style>
+          <a:lnRef idx="1">
+            <a:schemeClr val="accent1"/>
+          </a:lnRef>
+          <a:fillRef idx="0">
+            <a:schemeClr val="accent1"/>
+          </a:fillRef>
+          <a:effectRef idx="0">
+            <a:schemeClr val="accent1"/>
+          </a:effectRef>
+          <a:fontRef idx="minor">
+            <a:schemeClr val="tx1"/>
+          </a:fontRef>
+        </p:style>
+      </p:cxnSp>
+      <p:cxnSp>
+        <p:nvCxnSpPr>
+          <p:cNvPr id="41" name="Connector: Elbow 40">
+            <a:extLst>
+              <a:ext uri="{FF2B5EF4-FFF2-40B4-BE49-F238E27FC236}">
+                <a16:creationId xmlns:a16="http://schemas.microsoft.com/office/drawing/2014/main" id="{791C0033-2639-4E44-821F-BAD88A6DBE14}"/>
+              </a:ext>
+            </a:extLst>
+          </p:cNvPr>
+          <p:cNvCxnSpPr>
+            <a:stCxn id="16" idx="3"/>
+            <a:endCxn id="9" idx="1"/>
+          </p:cNvCxnSpPr>
+          <p:nvPr/>
+        </p:nvCxnSpPr>
+        <p:spPr>
+          <a:xfrm>
+            <a:off x="2183428" y="4734640"/>
+            <a:ext cx="265235" cy="2950"/>
+          </a:xfrm>
+          <a:prstGeom prst="bentConnector3">
+            <a:avLst/>
+          </a:prstGeom>
+          <a:ln w="25400">
+            <a:solidFill>
+              <a:schemeClr val="tx1"/>
+            </a:solidFill>
+            <a:headEnd type="none" w="med" len="med"/>
+            <a:tailEnd type="triangle"/>
+          </a:ln>
+        </p:spPr>
+        <p:style>
+          <a:lnRef idx="1">
+            <a:schemeClr val="accent1"/>
+          </a:lnRef>
+          <a:fillRef idx="0">
+            <a:schemeClr val="accent1"/>
+          </a:fillRef>
+          <a:effectRef idx="0">
+            <a:schemeClr val="accent1"/>
+          </a:effectRef>
+          <a:fontRef idx="minor">
+            <a:schemeClr val="tx1"/>
+          </a:fontRef>
+        </p:style>
+      </p:cxnSp>
+      <p:cxnSp>
+        <p:nvCxnSpPr>
+          <p:cNvPr id="43" name="Connector: Elbow 42">
+            <a:extLst>
+              <a:ext uri="{FF2B5EF4-FFF2-40B4-BE49-F238E27FC236}">
+                <a16:creationId xmlns:a16="http://schemas.microsoft.com/office/drawing/2014/main" id="{7C16ACAB-D4E0-447F-B2C2-49F623895A09}"/>
+              </a:ext>
+            </a:extLst>
+          </p:cNvPr>
+          <p:cNvCxnSpPr>
+            <a:stCxn id="5" idx="2"/>
+            <a:endCxn id="17" idx="0"/>
+          </p:cNvCxnSpPr>
+          <p:nvPr/>
+        </p:nvCxnSpPr>
+        <p:spPr>
+          <a:xfrm rot="16200000" flipH="1">
+            <a:off x="6253764" y="5131280"/>
+            <a:ext cx="170739" cy="3173"/>
+          </a:xfrm>
+          <a:prstGeom prst="bentConnector3">
+            <a:avLst/>
+          </a:prstGeom>
+          <a:ln w="25400">
+            <a:solidFill>
+              <a:schemeClr val="tx1"/>
+            </a:solidFill>
+            <a:headEnd type="none" w="med" len="med"/>
+            <a:tailEnd type="triangle"/>
+          </a:ln>
+        </p:spPr>
+        <p:style>
+          <a:lnRef idx="1">
+            <a:schemeClr val="accent1"/>
+          </a:lnRef>
+          <a:fillRef idx="0">
+            <a:schemeClr val="accent1"/>
+          </a:fillRef>
+          <a:effectRef idx="0">
+            <a:schemeClr val="accent1"/>
+          </a:effectRef>
+          <a:fontRef idx="minor">
+            <a:schemeClr val="tx1"/>
+          </a:fontRef>
+        </p:style>
+      </p:cxnSp>
+      <p:cxnSp>
+        <p:nvCxnSpPr>
+          <p:cNvPr id="45" name="Connector: Elbow 44">
+            <a:extLst>
+              <a:ext uri="{FF2B5EF4-FFF2-40B4-BE49-F238E27FC236}">
+                <a16:creationId xmlns:a16="http://schemas.microsoft.com/office/drawing/2014/main" id="{4F5314D6-2CB3-4D8B-80E7-67314E037186}"/>
+              </a:ext>
+            </a:extLst>
+          </p:cNvPr>
+          <p:cNvCxnSpPr>
+            <a:cxnSpLocks/>
+            <a:stCxn id="17" idx="2"/>
+            <a:endCxn id="19" idx="0"/>
+          </p:cNvCxnSpPr>
+          <p:nvPr/>
+        </p:nvCxnSpPr>
+        <p:spPr>
+          <a:xfrm rot="5400000">
+            <a:off x="6259210" y="5860626"/>
+            <a:ext cx="158260" cy="4760"/>
+          </a:xfrm>
+          <a:prstGeom prst="bentConnector3">
+            <a:avLst/>
+          </a:prstGeom>
+          <a:ln w="25400">
+            <a:solidFill>
+              <a:schemeClr val="tx1"/>
+            </a:solidFill>
+            <a:headEnd type="none" w="med" len="med"/>
+            <a:tailEnd type="triangle"/>
+          </a:ln>
+        </p:spPr>
+        <p:style>
+          <a:lnRef idx="1">
+            <a:schemeClr val="accent1"/>
+          </a:lnRef>
+          <a:fillRef idx="0">
+            <a:schemeClr val="accent1"/>
+          </a:fillRef>
+          <a:effectRef idx="0">
+            <a:schemeClr val="accent1"/>
+          </a:effectRef>
+          <a:fontRef idx="minor">
+            <a:schemeClr val="tx1"/>
+          </a:fontRef>
+        </p:style>
+      </p:cxnSp>
+      <p:cxnSp>
+        <p:nvCxnSpPr>
+          <p:cNvPr id="47" name="Connector: Elbow 46">
+            <a:extLst>
+              <a:ext uri="{FF2B5EF4-FFF2-40B4-BE49-F238E27FC236}">
+                <a16:creationId xmlns:a16="http://schemas.microsoft.com/office/drawing/2014/main" id="{EE2D1619-1B53-4DA7-8570-4A300C9FD246}"/>
+              </a:ext>
+            </a:extLst>
+          </p:cNvPr>
+          <p:cNvCxnSpPr>
+            <a:stCxn id="17" idx="1"/>
+            <a:endCxn id="18" idx="0"/>
+          </p:cNvCxnSpPr>
+          <p:nvPr/>
+        </p:nvCxnSpPr>
+        <p:spPr>
+          <a:xfrm rot="10800000" flipV="1">
+            <a:off x="4860637" y="5501057"/>
+            <a:ext cx="820660" cy="441078"/>
+          </a:xfrm>
+          <a:prstGeom prst="bentConnector2">
+            <a:avLst/>
+          </a:prstGeom>
+          <a:ln w="25400">
+            <a:solidFill>
+              <a:schemeClr val="tx1"/>
+            </a:solidFill>
+            <a:headEnd type="none" w="med" len="med"/>
+            <a:tailEnd type="triangle"/>
+          </a:ln>
+        </p:spPr>
+        <p:style>
+          <a:lnRef idx="1">
+            <a:schemeClr val="accent1"/>
+          </a:lnRef>
+          <a:fillRef idx="0">
+            <a:schemeClr val="accent1"/>
+          </a:fillRef>
+          <a:effectRef idx="0">
+            <a:schemeClr val="accent1"/>
+          </a:effectRef>
+          <a:fontRef idx="minor">
+            <a:schemeClr val="tx1"/>
+          </a:fontRef>
+        </p:style>
+      </p:cxnSp>
+      <p:cxnSp>
+        <p:nvCxnSpPr>
+          <p:cNvPr id="49" name="Connector: Elbow 48">
+            <a:extLst>
+              <a:ext uri="{FF2B5EF4-FFF2-40B4-BE49-F238E27FC236}">
+                <a16:creationId xmlns:a16="http://schemas.microsoft.com/office/drawing/2014/main" id="{0D12991A-8110-444F-9894-471E87879FCF}"/>
+              </a:ext>
+            </a:extLst>
+          </p:cNvPr>
+          <p:cNvCxnSpPr>
+            <a:stCxn id="17" idx="3"/>
+            <a:endCxn id="20" idx="0"/>
+          </p:cNvCxnSpPr>
+          <p:nvPr/>
+        </p:nvCxnSpPr>
+        <p:spPr>
+          <a:xfrm>
+            <a:off x="7000143" y="5501057"/>
+            <a:ext cx="820660" cy="441078"/>
+          </a:xfrm>
+          <a:prstGeom prst="bentConnector2">
+            <a:avLst/>
+          </a:prstGeom>
+          <a:ln w="25400">
+            <a:solidFill>
+              <a:schemeClr val="tx1"/>
+            </a:solidFill>
+            <a:headEnd type="none" w="med" len="med"/>
+            <a:tailEnd type="triangle"/>
+          </a:ln>
+        </p:spPr>
+        <p:style>
+          <a:lnRef idx="1">
+            <a:schemeClr val="accent1"/>
+          </a:lnRef>
+          <a:fillRef idx="0">
+            <a:schemeClr val="accent1"/>
+          </a:fillRef>
+          <a:effectRef idx="0">
+            <a:schemeClr val="accent1"/>
+          </a:effectRef>
+          <a:fontRef idx="minor">
+            <a:schemeClr val="tx1"/>
+          </a:fontRef>
+        </p:style>
+      </p:cxnSp>
+      <p:cxnSp>
+        <p:nvCxnSpPr>
+          <p:cNvPr id="54" name="Connector: Elbow 53">
+            <a:extLst>
+              <a:ext uri="{FF2B5EF4-FFF2-40B4-BE49-F238E27FC236}">
+                <a16:creationId xmlns:a16="http://schemas.microsoft.com/office/drawing/2014/main" id="{813702D9-17B7-4FEC-9FEE-62AF7FE095F2}"/>
+              </a:ext>
+            </a:extLst>
+          </p:cNvPr>
+          <p:cNvCxnSpPr>
+            <a:stCxn id="8" idx="2"/>
+            <a:endCxn id="5" idx="0"/>
+          </p:cNvCxnSpPr>
+          <p:nvPr/>
+        </p:nvCxnSpPr>
+        <p:spPr>
+          <a:xfrm rot="5400000">
+            <a:off x="6239134" y="4380272"/>
+            <a:ext cx="200001" cy="3173"/>
+          </a:xfrm>
+          <a:prstGeom prst="bentConnector3">
+            <a:avLst/>
+          </a:prstGeom>
+          <a:ln w="25400">
+            <a:solidFill>
+              <a:schemeClr val="tx1"/>
+            </a:solidFill>
+            <a:headEnd type="none" w="med" len="med"/>
+            <a:tailEnd type="triangle"/>
+          </a:ln>
+        </p:spPr>
+        <p:style>
+          <a:lnRef idx="1">
+            <a:schemeClr val="accent1"/>
+          </a:lnRef>
+          <a:fillRef idx="0">
+            <a:schemeClr val="accent1"/>
+          </a:fillRef>
+          <a:effectRef idx="0">
+            <a:schemeClr val="accent1"/>
+          </a:effectRef>
+          <a:fontRef idx="minor">
+            <a:schemeClr val="tx1"/>
+          </a:fontRef>
+        </p:style>
+      </p:cxnSp>
+      <p:sp>
+        <p:nvSpPr>
+          <p:cNvPr id="2" name="Rectangle 1">
+            <a:extLst>
+              <a:ext uri="{FF2B5EF4-FFF2-40B4-BE49-F238E27FC236}">
+                <a16:creationId xmlns:a16="http://schemas.microsoft.com/office/drawing/2014/main" id="{4AB61B0A-087F-4F8C-8930-B0A58420936D}"/>
+              </a:ext>
+            </a:extLst>
+          </p:cNvPr>
+          <p:cNvSpPr/>
+          <p:nvPr/>
+        </p:nvSpPr>
+        <p:spPr bwMode="gray">
+          <a:xfrm>
+            <a:off x="1934306" y="1522534"/>
+            <a:ext cx="7280030" cy="1713034"/>
+          </a:xfrm>
+          <a:prstGeom prst="rect">
+            <a:avLst/>
+          </a:prstGeom>
+          <a:noFill/>
+          <a:ln w="25400" algn="ctr">
+            <a:solidFill>
+              <a:schemeClr val="accent1"/>
+            </a:solidFill>
+            <a:miter lim="800000"/>
+            <a:headEnd/>
+            <a:tailEnd/>
+          </a:ln>
+        </p:spPr>
+        <p:txBody>
+          <a:bodyPr lIns="90000" tIns="72000" rIns="90000" bIns="72000" rtlCol="0" anchor="ctr"/>
+          <a:lstStyle/>
+          <a:p>
+            <a:pPr marR="0" algn="ctr" defTabSz="914400" eaLnBrk="1" fontAlgn="base" latinLnBrk="0" hangingPunct="1">
+              <a:lnSpc>
+                <a:spcPct val="100000"/>
+              </a:lnSpc>
+              <a:spcBef>
+                <a:spcPct val="50000"/>
+              </a:spcBef>
+              <a:spcAft>
+                <a:spcPct val="0"/>
+              </a:spcAft>
+              <a:buClr>
+                <a:srgbClr val="F0AB00"/>
+              </a:buClr>
+              <a:buSzPct val="80000"/>
+              <a:tabLst/>
+            </a:pPr>
+            <a:endParaRPr kumimoji="0" lang="en-US" sz="1800" b="0" i="0" u="none" strike="noStrike" kern="0" cap="none" spc="0" normalizeH="0" baseline="0" noProof="0" dirty="0" err="1">
+              <a:ln>
+                <a:noFill/>
+              </a:ln>
+              <a:effectLst/>
+              <a:uLnTx/>
+              <a:uFillTx/>
+              <a:ea typeface="Arial Unicode MS" pitchFamily="34" charset="-128"/>
+              <a:cs typeface="Arial Unicode MS" pitchFamily="34" charset="-128"/>
+            </a:endParaRPr>
+          </a:p>
+        </p:txBody>
+      </p:sp>
+      <p:sp>
+        <p:nvSpPr>
+          <p:cNvPr id="31" name="Rectangle 30">
+            <a:extLst>
+              <a:ext uri="{FF2B5EF4-FFF2-40B4-BE49-F238E27FC236}">
+                <a16:creationId xmlns:a16="http://schemas.microsoft.com/office/drawing/2014/main" id="{453B5E50-BB99-4496-81D7-55AF178A0418}"/>
+              </a:ext>
+            </a:extLst>
+          </p:cNvPr>
+          <p:cNvSpPr/>
+          <p:nvPr/>
+        </p:nvSpPr>
+        <p:spPr bwMode="gray">
+          <a:xfrm>
+            <a:off x="504001" y="4344153"/>
+            <a:ext cx="5016059" cy="756095"/>
+          </a:xfrm>
+          <a:prstGeom prst="rect">
+            <a:avLst/>
+          </a:prstGeom>
+          <a:noFill/>
+          <a:ln w="25400" algn="ctr">
+            <a:solidFill>
+              <a:schemeClr val="accent1"/>
+            </a:solidFill>
+            <a:miter lim="800000"/>
+            <a:headEnd/>
+            <a:tailEnd/>
+          </a:ln>
+        </p:spPr>
+        <p:txBody>
+          <a:bodyPr lIns="90000" tIns="72000" rIns="90000" bIns="72000" rtlCol="0" anchor="ctr"/>
+          <a:lstStyle/>
+          <a:p>
+            <a:pPr marR="0" algn="ctr" defTabSz="914400" eaLnBrk="1" fontAlgn="base" latinLnBrk="0" hangingPunct="1">
+              <a:lnSpc>
+                <a:spcPct val="100000"/>
+              </a:lnSpc>
+              <a:spcBef>
+                <a:spcPct val="50000"/>
+              </a:spcBef>
+              <a:spcAft>
+                <a:spcPct val="0"/>
+              </a:spcAft>
+              <a:buClr>
+                <a:srgbClr val="F0AB00"/>
+              </a:buClr>
+              <a:buSzPct val="80000"/>
+              <a:tabLst/>
+            </a:pPr>
+            <a:endParaRPr kumimoji="0" lang="en-US" sz="1800" b="0" i="0" u="none" strike="noStrike" kern="0" cap="none" spc="0" normalizeH="0" baseline="0" noProof="0" dirty="0" err="1">
+              <a:ln>
+                <a:noFill/>
+              </a:ln>
+              <a:effectLst/>
+              <a:uLnTx/>
+              <a:uFillTx/>
+              <a:ea typeface="Arial Unicode MS" pitchFamily="34" charset="-128"/>
+              <a:cs typeface="Arial Unicode MS" pitchFamily="34" charset="-128"/>
+            </a:endParaRPr>
+          </a:p>
+        </p:txBody>
+      </p:sp>
+      <p:sp>
+        <p:nvSpPr>
+          <p:cNvPr id="32" name="Rectangle 31">
+            <a:extLst>
+              <a:ext uri="{FF2B5EF4-FFF2-40B4-BE49-F238E27FC236}">
+                <a16:creationId xmlns:a16="http://schemas.microsoft.com/office/drawing/2014/main" id="{8AA9A5A1-A19A-4DD7-9193-A0E3FB21EB2C}"/>
+              </a:ext>
+            </a:extLst>
+          </p:cNvPr>
+          <p:cNvSpPr/>
+          <p:nvPr/>
+        </p:nvSpPr>
+        <p:spPr bwMode="gray">
+          <a:xfrm>
+            <a:off x="3933826" y="5159586"/>
+            <a:ext cx="4823312" cy="1434645"/>
+          </a:xfrm>
+          <a:prstGeom prst="rect">
+            <a:avLst/>
+          </a:prstGeom>
+          <a:noFill/>
+          <a:ln w="25400" algn="ctr">
+            <a:solidFill>
+              <a:schemeClr val="accent1"/>
+            </a:solidFill>
+            <a:miter lim="800000"/>
+            <a:headEnd/>
+            <a:tailEnd/>
+          </a:ln>
+        </p:spPr>
+        <p:txBody>
+          <a:bodyPr lIns="90000" tIns="72000" rIns="90000" bIns="72000" rtlCol="0" anchor="ctr"/>
+          <a:lstStyle/>
+          <a:p>
+            <a:pPr marR="0" algn="ctr" defTabSz="914400" eaLnBrk="1" fontAlgn="base" latinLnBrk="0" hangingPunct="1">
+              <a:lnSpc>
+                <a:spcPct val="100000"/>
+              </a:lnSpc>
+              <a:spcBef>
+                <a:spcPct val="50000"/>
+              </a:spcBef>
+              <a:spcAft>
+                <a:spcPct val="0"/>
+              </a:spcAft>
+              <a:buClr>
+                <a:srgbClr val="F0AB00"/>
+              </a:buClr>
+              <a:buSzPct val="80000"/>
+              <a:tabLst/>
+            </a:pPr>
+            <a:endParaRPr kumimoji="0" lang="en-US" sz="1800" b="0" i="0" u="none" strike="noStrike" kern="0" cap="none" spc="0" normalizeH="0" baseline="0" noProof="0" dirty="0" err="1">
+              <a:ln>
+                <a:noFill/>
+              </a:ln>
+              <a:effectLst/>
+              <a:uLnTx/>
+              <a:uFillTx/>
+              <a:ea typeface="Arial Unicode MS" pitchFamily="34" charset="-128"/>
+              <a:cs typeface="Arial Unicode MS" pitchFamily="34" charset="-128"/>
+            </a:endParaRPr>
+          </a:p>
+        </p:txBody>
+      </p:sp>
+      <p:sp>
+        <p:nvSpPr>
+          <p:cNvPr id="6" name="TextBox 5">
+            <a:extLst>
+              <a:ext uri="{FF2B5EF4-FFF2-40B4-BE49-F238E27FC236}">
+                <a16:creationId xmlns:a16="http://schemas.microsoft.com/office/drawing/2014/main" id="{7DB4ECE1-B1FF-45F0-BDCF-EEF13C0395F9}"/>
+              </a:ext>
+            </a:extLst>
+          </p:cNvPr>
+          <p:cNvSpPr txBox="1"/>
+          <p:nvPr/>
+        </p:nvSpPr>
+        <p:spPr>
+          <a:xfrm>
+            <a:off x="2119104" y="1586212"/>
+            <a:ext cx="1284006" cy="430887"/>
+          </a:xfrm>
+          <a:prstGeom prst="rect">
+            <a:avLst/>
+          </a:prstGeom>
+          <a:solidFill>
+            <a:schemeClr val="bg1">
+              <a:alpha val="58000"/>
+            </a:schemeClr>
+          </a:solidFill>
+        </p:spPr>
+        <p:txBody>
+          <a:bodyPr wrap="none" lIns="0" tIns="0" rIns="0" bIns="0" rtlCol="0">
+            <a:spAutoFit/>
+          </a:bodyPr>
+          <a:lstStyle/>
+          <a:p>
+            <a:pPr fontAlgn="base">
+              <a:spcBef>
+                <a:spcPct val="50000"/>
+              </a:spcBef>
+              <a:spcAft>
+                <a:spcPct val="0"/>
+              </a:spcAft>
+              <a:buClr>
+                <a:srgbClr val="F0AB00"/>
+              </a:buClr>
+              <a:buSzPct val="80000"/>
+            </a:pPr>
+            <a:r>
+              <a:rPr lang="en-US" sz="1400" kern="0" dirty="0">
+                <a:latin typeface="Arial Rounded MT Bold" panose="020F0704030504030204" pitchFamily="34" charset="0"/>
+                <a:ea typeface="Arial Unicode MS" pitchFamily="34" charset="-128"/>
+                <a:cs typeface="Arial Unicode MS" pitchFamily="34" charset="-128"/>
+              </a:rPr>
+              <a:t>a resource for </a:t>
+            </a:r>
+            <a:br>
+              <a:rPr lang="en-US" sz="1400" kern="0" dirty="0">
+                <a:latin typeface="Arial Rounded MT Bold" panose="020F0704030504030204" pitchFamily="34" charset="0"/>
+                <a:ea typeface="Arial Unicode MS" pitchFamily="34" charset="-128"/>
+                <a:cs typeface="Arial Unicode MS" pitchFamily="34" charset="-128"/>
+              </a:rPr>
+            </a:br>
+            <a:r>
+              <a:rPr lang="en-US" sz="1400" kern="0" dirty="0">
+                <a:latin typeface="Arial Rounded MT Bold" panose="020F0704030504030204" pitchFamily="34" charset="0"/>
+                <a:ea typeface="Arial Unicode MS" pitchFamily="34" charset="-128"/>
+                <a:cs typeface="Arial Unicode MS" pitchFamily="34" charset="-128"/>
+              </a:rPr>
+              <a:t>every purpose</a:t>
+            </a:r>
+          </a:p>
+        </p:txBody>
+      </p:sp>
+      <p:sp>
+        <p:nvSpPr>
+          <p:cNvPr id="35" name="TextBox 34">
+            <a:extLst>
+              <a:ext uri="{FF2B5EF4-FFF2-40B4-BE49-F238E27FC236}">
+                <a16:creationId xmlns:a16="http://schemas.microsoft.com/office/drawing/2014/main" id="{8E6776E6-95DF-4326-B02F-33B680F021F4}"/>
+              </a:ext>
+            </a:extLst>
+          </p:cNvPr>
+          <p:cNvSpPr txBox="1"/>
+          <p:nvPr/>
+        </p:nvSpPr>
+        <p:spPr>
+          <a:xfrm>
+            <a:off x="7403077" y="4897297"/>
+            <a:ext cx="1567737" cy="215444"/>
+          </a:xfrm>
+          <a:prstGeom prst="rect">
+            <a:avLst/>
+          </a:prstGeom>
+          <a:solidFill>
+            <a:schemeClr val="bg1">
+              <a:alpha val="58000"/>
+            </a:schemeClr>
+          </a:solidFill>
+        </p:spPr>
+        <p:txBody>
+          <a:bodyPr wrap="none" lIns="0" tIns="0" rIns="0" bIns="0" rtlCol="0">
+            <a:spAutoFit/>
+          </a:bodyPr>
+          <a:lstStyle>
+            <a:defPPr>
+              <a:defRPr lang="de-DE"/>
+            </a:defPPr>
+            <a:lvl1pPr fontAlgn="base">
+              <a:spcBef>
+                <a:spcPct val="50000"/>
+              </a:spcBef>
+              <a:spcAft>
+                <a:spcPct val="0"/>
+              </a:spcAft>
+              <a:buClr>
+                <a:srgbClr val="F0AB00"/>
+              </a:buClr>
+              <a:buSzPct val="80000"/>
+              <a:defRPr sz="1400" kern="0">
+                <a:latin typeface="Arial Rounded MT Bold" panose="020F0704030504030204" pitchFamily="34" charset="0"/>
+                <a:ea typeface="Arial Unicode MS" pitchFamily="34" charset="-128"/>
+                <a:cs typeface="Arial Unicode MS" pitchFamily="34" charset="-128"/>
+              </a:defRPr>
+            </a:lvl1pPr>
+          </a:lstStyle>
+          <a:p>
+            <a:r>
+              <a:rPr lang="en-US" dirty="0"/>
+              <a:t>data / persistence</a:t>
+            </a:r>
+          </a:p>
+        </p:txBody>
+      </p:sp>
+      <p:cxnSp>
+        <p:nvCxnSpPr>
+          <p:cNvPr id="22" name="Straight Arrow Connector 21">
+            <a:extLst>
+              <a:ext uri="{FF2B5EF4-FFF2-40B4-BE49-F238E27FC236}">
+                <a16:creationId xmlns:a16="http://schemas.microsoft.com/office/drawing/2014/main" id="{91467FA9-E653-4522-9AAB-5547771E9A87}"/>
+              </a:ext>
+            </a:extLst>
+          </p:cNvPr>
+          <p:cNvCxnSpPr/>
+          <p:nvPr/>
+        </p:nvCxnSpPr>
+        <p:spPr>
+          <a:xfrm>
+            <a:off x="1219197" y="6203934"/>
+            <a:ext cx="409278" cy="0"/>
+          </a:xfrm>
+          <a:prstGeom prst="straightConnector1">
+            <a:avLst/>
+          </a:prstGeom>
+          <a:ln w="19050">
+            <a:solidFill>
+              <a:schemeClr val="tx1"/>
+            </a:solidFill>
+            <a:headEnd type="none" w="med" len="med"/>
+            <a:tailEnd type="triangle"/>
+          </a:ln>
+        </p:spPr>
+        <p:style>
+          <a:lnRef idx="1">
+            <a:schemeClr val="accent1"/>
+          </a:lnRef>
+          <a:fillRef idx="0">
+            <a:schemeClr val="accent1"/>
+          </a:fillRef>
+          <a:effectRef idx="0">
+            <a:schemeClr val="accent1"/>
+          </a:effectRef>
+          <a:fontRef idx="minor">
+            <a:schemeClr val="tx1"/>
+          </a:fontRef>
+        </p:style>
+      </p:cxnSp>
+      <p:sp>
+        <p:nvSpPr>
+          <p:cNvPr id="24" name="TextBox 23">
+            <a:extLst>
+              <a:ext uri="{FF2B5EF4-FFF2-40B4-BE49-F238E27FC236}">
+                <a16:creationId xmlns:a16="http://schemas.microsoft.com/office/drawing/2014/main" id="{5A418264-CAD2-49CB-98A8-CF0AACEA9BAC}"/>
+              </a:ext>
+            </a:extLst>
+          </p:cNvPr>
+          <p:cNvSpPr txBox="1"/>
+          <p:nvPr/>
+        </p:nvSpPr>
+        <p:spPr>
+          <a:xfrm>
+            <a:off x="1702675" y="6088324"/>
+            <a:ext cx="1154162" cy="215444"/>
+          </a:xfrm>
+          <a:prstGeom prst="rect">
+            <a:avLst/>
+          </a:prstGeom>
+          <a:noFill/>
+        </p:spPr>
+        <p:txBody>
+          <a:bodyPr wrap="none" lIns="0" tIns="0" rIns="0" bIns="0" rtlCol="0">
+            <a:spAutoFit/>
+          </a:bodyPr>
+          <a:lstStyle/>
+          <a:p>
+            <a:pPr fontAlgn="base">
+              <a:spcBef>
+                <a:spcPct val="50000"/>
+              </a:spcBef>
+              <a:spcAft>
+                <a:spcPct val="0"/>
+              </a:spcAft>
+              <a:buClr>
+                <a:srgbClr val="F0AB00"/>
+              </a:buClr>
+              <a:buSzPct val="80000"/>
+            </a:pPr>
+            <a:r>
+              <a:rPr lang="en-US" sz="1400" kern="0" dirty="0">
+                <a:ea typeface="Arial Unicode MS" pitchFamily="34" charset="-128"/>
+                <a:cs typeface="Arial Unicode MS" pitchFamily="34" charset="-128"/>
+              </a:rPr>
+              <a:t>uses / controls</a:t>
+            </a:r>
+          </a:p>
+        </p:txBody>
+      </p:sp>
+      <p:sp>
+        <p:nvSpPr>
+          <p:cNvPr id="38" name="TextBox 37">
+            <a:extLst>
+              <a:ext uri="{FF2B5EF4-FFF2-40B4-BE49-F238E27FC236}">
+                <a16:creationId xmlns:a16="http://schemas.microsoft.com/office/drawing/2014/main" id="{1C09E1CC-6970-4FD9-8AC4-50A4089FFEEA}"/>
+              </a:ext>
+            </a:extLst>
+          </p:cNvPr>
+          <p:cNvSpPr txBox="1"/>
+          <p:nvPr/>
+        </p:nvSpPr>
+        <p:spPr>
+          <a:xfrm>
+            <a:off x="523679" y="4092428"/>
+            <a:ext cx="985847" cy="215444"/>
+          </a:xfrm>
+          <a:prstGeom prst="rect">
+            <a:avLst/>
+          </a:prstGeom>
+          <a:solidFill>
+            <a:schemeClr val="bg1">
+              <a:alpha val="58000"/>
+            </a:schemeClr>
+          </a:solidFill>
+        </p:spPr>
+        <p:txBody>
+          <a:bodyPr wrap="none" lIns="0" tIns="0" rIns="0" bIns="0" rtlCol="0">
+            <a:spAutoFit/>
+          </a:bodyPr>
+          <a:lstStyle>
+            <a:defPPr>
+              <a:defRPr lang="de-DE"/>
+            </a:defPPr>
+            <a:lvl1pPr fontAlgn="base">
+              <a:spcBef>
+                <a:spcPct val="50000"/>
+              </a:spcBef>
+              <a:spcAft>
+                <a:spcPct val="0"/>
+              </a:spcAft>
+              <a:buClr>
+                <a:srgbClr val="F0AB00"/>
+              </a:buClr>
+              <a:buSzPct val="80000"/>
+              <a:defRPr sz="1400" kern="0">
+                <a:latin typeface="Arial Rounded MT Bold" panose="020F0704030504030204" pitchFamily="34" charset="0"/>
+                <a:ea typeface="Arial Unicode MS" pitchFamily="34" charset="-128"/>
+                <a:cs typeface="Arial Unicode MS" pitchFamily="34" charset="-128"/>
+              </a:defRPr>
+            </a:lvl1pPr>
+          </a:lstStyle>
+          <a:p>
+            <a:r>
+              <a:rPr lang="en-US" dirty="0"/>
+              <a:t>networking</a:t>
+            </a:r>
+          </a:p>
+        </p:txBody>
+      </p:sp>
+      <p:sp>
+        <p:nvSpPr>
+          <p:cNvPr id="40" name="Rectangle: Rounded Corners 39">
+            <a:extLst>
+              <a:ext uri="{FF2B5EF4-FFF2-40B4-BE49-F238E27FC236}">
+                <a16:creationId xmlns:a16="http://schemas.microsoft.com/office/drawing/2014/main" id="{98A8C26E-40CA-4772-8BB9-FD28401DDE3F}"/>
+              </a:ext>
+            </a:extLst>
+          </p:cNvPr>
+          <p:cNvSpPr/>
+          <p:nvPr/>
+        </p:nvSpPr>
+        <p:spPr bwMode="gray">
+          <a:xfrm>
+            <a:off x="4066445" y="4439380"/>
+            <a:ext cx="1318846" cy="565639"/>
+          </a:xfrm>
+          <a:prstGeom prst="roundRect">
+            <a:avLst/>
+          </a:prstGeom>
+          <a:solidFill>
+            <a:srgbClr val="66CCFF"/>
+          </a:solidFill>
+          <a:ln w="12700" algn="ctr">
+            <a:solidFill>
+              <a:schemeClr val="bg1">
+                <a:lumMod val="75000"/>
+              </a:schemeClr>
+            </a:solidFill>
+            <a:miter lim="800000"/>
+            <a:headEnd/>
+            <a:tailEnd/>
+          </a:ln>
+        </p:spPr>
+        <p:txBody>
+          <a:bodyPr lIns="90000" tIns="72000" rIns="90000" bIns="72000" rtlCol="0" anchor="ctr"/>
+          <a:lstStyle/>
+          <a:p>
+            <a:pPr marR="0" algn="ctr" defTabSz="914400" eaLnBrk="1" fontAlgn="base" latinLnBrk="0" hangingPunct="1">
+              <a:lnSpc>
+                <a:spcPct val="100000"/>
+              </a:lnSpc>
+              <a:spcBef>
+                <a:spcPct val="50000"/>
+              </a:spcBef>
+              <a:spcAft>
+                <a:spcPct val="0"/>
+              </a:spcAft>
+              <a:buClr>
+                <a:srgbClr val="F0AB00"/>
+              </a:buClr>
+              <a:buSzPct val="80000"/>
+              <a:tabLst/>
+            </a:pPr>
+            <a:r>
+              <a:rPr kumimoji="0" lang="en-US" sz="1400" b="0" i="0" u="none" strike="noStrike" kern="0" cap="none" spc="0" normalizeH="0" baseline="0" noProof="0" dirty="0">
+                <a:ln>
+                  <a:noFill/>
+                </a:ln>
+                <a:effectLst/>
+                <a:uLnTx/>
+                <a:uFillTx/>
+                <a:ea typeface="Arial Unicode MS" pitchFamily="34" charset="-128"/>
+                <a:cs typeface="Arial Unicode MS" pitchFamily="34" charset="-128"/>
+              </a:rPr>
+              <a:t>Endpoint</a:t>
+            </a:r>
+          </a:p>
+        </p:txBody>
+      </p:sp>
+      <p:cxnSp>
+        <p:nvCxnSpPr>
+          <p:cNvPr id="42" name="Connector: Elbow 41">
+            <a:extLst>
+              <a:ext uri="{FF2B5EF4-FFF2-40B4-BE49-F238E27FC236}">
+                <a16:creationId xmlns:a16="http://schemas.microsoft.com/office/drawing/2014/main" id="{3D05F7E3-44FD-4374-B594-3B5F41B3EAB7}"/>
+              </a:ext>
+            </a:extLst>
+          </p:cNvPr>
+          <p:cNvCxnSpPr>
+            <a:cxnSpLocks/>
+          </p:cNvCxnSpPr>
+          <p:nvPr/>
+        </p:nvCxnSpPr>
+        <p:spPr>
+          <a:xfrm flipV="1">
+            <a:off x="3787821" y="4737936"/>
+            <a:ext cx="287709" cy="2441"/>
+          </a:xfrm>
+          <a:prstGeom prst="bentConnector3">
+            <a:avLst/>
+          </a:prstGeom>
+          <a:ln w="25400">
+            <a:solidFill>
+              <a:schemeClr val="tx1"/>
+            </a:solidFill>
+            <a:headEnd type="none" w="med" len="med"/>
+            <a:tailEnd type="triangle"/>
+          </a:ln>
+        </p:spPr>
+        <p:style>
+          <a:lnRef idx="1">
+            <a:schemeClr val="accent1"/>
+          </a:lnRef>
+          <a:fillRef idx="0">
+            <a:schemeClr val="accent1"/>
+          </a:fillRef>
+          <a:effectRef idx="0">
+            <a:schemeClr val="accent1"/>
+          </a:effectRef>
+          <a:fontRef idx="minor">
+            <a:schemeClr val="tx1"/>
+          </a:fontRef>
+        </p:style>
+      </p:cxnSp>
+      <p:sp>
+        <p:nvSpPr>
+          <p:cNvPr id="46" name="Rectangle: Rounded Corners 45">
+            <a:extLst>
+              <a:ext uri="{FF2B5EF4-FFF2-40B4-BE49-F238E27FC236}">
+                <a16:creationId xmlns:a16="http://schemas.microsoft.com/office/drawing/2014/main" id="{C98965CC-D284-42CE-9C7E-D80736C3C187}"/>
+              </a:ext>
+            </a:extLst>
+          </p:cNvPr>
+          <p:cNvSpPr/>
+          <p:nvPr/>
+        </p:nvSpPr>
+        <p:spPr bwMode="gray">
+          <a:xfrm>
+            <a:off x="9869137" y="1648047"/>
+            <a:ext cx="1523873" cy="565639"/>
+          </a:xfrm>
+          <a:prstGeom prst="roundRect">
+            <a:avLst/>
+          </a:prstGeom>
+          <a:solidFill>
+            <a:srgbClr val="66CCFF"/>
+          </a:solidFill>
+          <a:ln w="12700" algn="ctr">
+            <a:solidFill>
+              <a:schemeClr val="bg1">
+                <a:lumMod val="75000"/>
+              </a:schemeClr>
+            </a:solidFill>
+            <a:miter lim="800000"/>
+            <a:headEnd/>
+            <a:tailEnd/>
+          </a:ln>
+        </p:spPr>
+        <p:txBody>
+          <a:bodyPr lIns="90000" tIns="72000" rIns="90000" bIns="72000" rtlCol="0" anchor="ctr"/>
+          <a:lstStyle/>
+          <a:p>
+            <a:pPr marR="0" algn="ctr" defTabSz="914400" eaLnBrk="1" fontAlgn="base" latinLnBrk="0" hangingPunct="1">
+              <a:lnSpc>
+                <a:spcPct val="100000"/>
+              </a:lnSpc>
+              <a:spcBef>
+                <a:spcPct val="50000"/>
+              </a:spcBef>
+              <a:spcAft>
+                <a:spcPct val="0"/>
+              </a:spcAft>
+              <a:buClr>
+                <a:srgbClr val="F0AB00"/>
+              </a:buClr>
+              <a:buSzPct val="80000"/>
+              <a:tabLst/>
+            </a:pPr>
+            <a:r>
+              <a:rPr kumimoji="0" lang="en-US" sz="1400" b="0" i="0" u="none" strike="noStrike" kern="0" cap="none" spc="0" normalizeH="0" baseline="0" noProof="0" dirty="0" err="1">
+                <a:ln>
+                  <a:noFill/>
+                </a:ln>
+                <a:effectLst/>
+                <a:uLnTx/>
+                <a:uFillTx/>
+                <a:ea typeface="Arial Unicode MS" pitchFamily="34" charset="-128"/>
+                <a:cs typeface="Arial Unicode MS" pitchFamily="34" charset="-128"/>
+              </a:rPr>
+              <a:t>ResourceQuota</a:t>
+            </a:r>
+            <a:endParaRPr kumimoji="0" lang="en-US" sz="1400" b="0" i="0" u="none" strike="noStrike" kern="0" cap="none" spc="0" normalizeH="0" baseline="0" noProof="0" dirty="0">
+              <a:ln>
+                <a:noFill/>
+              </a:ln>
+              <a:effectLst/>
+              <a:uLnTx/>
+              <a:uFillTx/>
+              <a:ea typeface="Arial Unicode MS" pitchFamily="34" charset="-128"/>
+              <a:cs typeface="Arial Unicode MS" pitchFamily="34" charset="-128"/>
+            </a:endParaRPr>
+          </a:p>
+        </p:txBody>
+      </p:sp>
+      <p:sp>
+        <p:nvSpPr>
+          <p:cNvPr id="48" name="Rectangle: Rounded Corners 47">
+            <a:extLst>
+              <a:ext uri="{FF2B5EF4-FFF2-40B4-BE49-F238E27FC236}">
+                <a16:creationId xmlns:a16="http://schemas.microsoft.com/office/drawing/2014/main" id="{EB7FB4D8-D7CD-4A4A-B243-5CCBE4A05763}"/>
+              </a:ext>
+            </a:extLst>
+          </p:cNvPr>
+          <p:cNvSpPr/>
+          <p:nvPr/>
+        </p:nvSpPr>
+        <p:spPr bwMode="gray">
+          <a:xfrm>
+            <a:off x="9869136" y="2366076"/>
+            <a:ext cx="1523873" cy="565639"/>
+          </a:xfrm>
+          <a:prstGeom prst="roundRect">
+            <a:avLst/>
+          </a:prstGeom>
+          <a:solidFill>
+            <a:srgbClr val="66CCFF"/>
+          </a:solidFill>
+          <a:ln w="12700" algn="ctr">
+            <a:solidFill>
+              <a:schemeClr val="bg1">
+                <a:lumMod val="75000"/>
+              </a:schemeClr>
+            </a:solidFill>
+            <a:miter lim="800000"/>
+            <a:headEnd/>
+            <a:tailEnd/>
+          </a:ln>
+        </p:spPr>
+        <p:txBody>
+          <a:bodyPr lIns="90000" tIns="72000" rIns="90000" bIns="72000" rtlCol="0" anchor="ctr"/>
+          <a:lstStyle/>
+          <a:p>
+            <a:pPr marR="0" algn="ctr" defTabSz="914400" eaLnBrk="1" fontAlgn="base" latinLnBrk="0" hangingPunct="1">
+              <a:lnSpc>
+                <a:spcPct val="100000"/>
+              </a:lnSpc>
+              <a:spcBef>
+                <a:spcPct val="50000"/>
+              </a:spcBef>
+              <a:spcAft>
+                <a:spcPct val="0"/>
+              </a:spcAft>
+              <a:buClr>
+                <a:srgbClr val="F0AB00"/>
+              </a:buClr>
+              <a:buSzPct val="80000"/>
+              <a:tabLst/>
+            </a:pPr>
+            <a:r>
+              <a:rPr kumimoji="0" lang="en-US" sz="1400" b="0" i="0" u="none" strike="noStrike" kern="0" cap="none" spc="0" normalizeH="0" baseline="0" noProof="0" dirty="0" err="1">
+                <a:ln>
+                  <a:noFill/>
+                </a:ln>
+                <a:effectLst/>
+                <a:uLnTx/>
+                <a:uFillTx/>
+                <a:ea typeface="Arial Unicode MS" pitchFamily="34" charset="-128"/>
+                <a:cs typeface="Arial Unicode MS" pitchFamily="34" charset="-128"/>
+              </a:rPr>
+              <a:t>LimitRange</a:t>
+            </a:r>
+            <a:endParaRPr kumimoji="0" lang="en-US" sz="1400" b="0" i="0" u="none" strike="noStrike" kern="0" cap="none" spc="0" normalizeH="0" baseline="0" noProof="0" dirty="0">
+              <a:ln>
+                <a:noFill/>
+              </a:ln>
+              <a:effectLst/>
+              <a:uLnTx/>
+              <a:uFillTx/>
+              <a:ea typeface="Arial Unicode MS" pitchFamily="34" charset="-128"/>
+              <a:cs typeface="Arial Unicode MS" pitchFamily="34" charset="-128"/>
+            </a:endParaRPr>
+          </a:p>
+        </p:txBody>
+      </p:sp>
+      <p:sp>
+        <p:nvSpPr>
+          <p:cNvPr id="50" name="Rectangle: Rounded Corners 49">
+            <a:extLst>
+              <a:ext uri="{FF2B5EF4-FFF2-40B4-BE49-F238E27FC236}">
+                <a16:creationId xmlns:a16="http://schemas.microsoft.com/office/drawing/2014/main" id="{89716035-5C71-4201-8F38-8885D0D09134}"/>
+              </a:ext>
+            </a:extLst>
+          </p:cNvPr>
+          <p:cNvSpPr/>
+          <p:nvPr/>
+        </p:nvSpPr>
+        <p:spPr bwMode="gray">
+          <a:xfrm>
+            <a:off x="9869137" y="4320492"/>
+            <a:ext cx="1523873" cy="565639"/>
+          </a:xfrm>
+          <a:prstGeom prst="roundRect">
+            <a:avLst/>
+          </a:prstGeom>
+          <a:solidFill>
+            <a:srgbClr val="66CCFF"/>
+          </a:solidFill>
+          <a:ln w="12700" algn="ctr">
+            <a:solidFill>
+              <a:schemeClr val="bg1">
+                <a:lumMod val="75000"/>
+              </a:schemeClr>
+            </a:solidFill>
+            <a:miter lim="800000"/>
+            <a:headEnd/>
+            <a:tailEnd/>
+          </a:ln>
+        </p:spPr>
+        <p:txBody>
+          <a:bodyPr lIns="90000" tIns="72000" rIns="90000" bIns="72000" rtlCol="0" anchor="ctr"/>
+          <a:lstStyle/>
+          <a:p>
+            <a:pPr marR="0" algn="ctr" defTabSz="914400" eaLnBrk="1" fontAlgn="base" latinLnBrk="0" hangingPunct="1">
+              <a:lnSpc>
+                <a:spcPct val="100000"/>
+              </a:lnSpc>
+              <a:spcBef>
+                <a:spcPct val="50000"/>
+              </a:spcBef>
+              <a:spcAft>
+                <a:spcPct val="0"/>
+              </a:spcAft>
+              <a:buClr>
+                <a:srgbClr val="F0AB00"/>
+              </a:buClr>
+              <a:buSzPct val="80000"/>
+              <a:tabLst/>
+            </a:pPr>
+            <a:r>
+              <a:rPr kumimoji="0" lang="en-US" sz="1400" b="0" i="0" u="none" strike="noStrike" kern="0" cap="none" spc="0" normalizeH="0" baseline="0" noProof="0" dirty="0" err="1">
+                <a:ln>
+                  <a:noFill/>
+                </a:ln>
+                <a:effectLst/>
+                <a:uLnTx/>
+                <a:uFillTx/>
+                <a:ea typeface="Arial Unicode MS" pitchFamily="34" charset="-128"/>
+                <a:cs typeface="Arial Unicode MS" pitchFamily="34" charset="-128"/>
+              </a:rPr>
+              <a:t>ServiceAccount</a:t>
+            </a:r>
+            <a:endParaRPr kumimoji="0" lang="en-US" sz="1400" b="0" i="0" u="none" strike="noStrike" kern="0" cap="none" spc="0" normalizeH="0" baseline="0" noProof="0" dirty="0">
+              <a:ln>
+                <a:noFill/>
+              </a:ln>
+              <a:effectLst/>
+              <a:uLnTx/>
+              <a:uFillTx/>
+              <a:ea typeface="Arial Unicode MS" pitchFamily="34" charset="-128"/>
+              <a:cs typeface="Arial Unicode MS" pitchFamily="34" charset="-128"/>
+            </a:endParaRPr>
+          </a:p>
+        </p:txBody>
+      </p:sp>
+      <p:sp>
+        <p:nvSpPr>
+          <p:cNvPr id="51" name="Rectangle 50">
+            <a:extLst>
+              <a:ext uri="{FF2B5EF4-FFF2-40B4-BE49-F238E27FC236}">
+                <a16:creationId xmlns:a16="http://schemas.microsoft.com/office/drawing/2014/main" id="{454336AE-DAEB-4AE7-B821-DE7C2BE0F156}"/>
+              </a:ext>
+            </a:extLst>
+          </p:cNvPr>
+          <p:cNvSpPr/>
+          <p:nvPr/>
+        </p:nvSpPr>
+        <p:spPr bwMode="gray">
+          <a:xfrm>
+            <a:off x="9581667" y="1522534"/>
+            <a:ext cx="2092821" cy="1713034"/>
+          </a:xfrm>
+          <a:prstGeom prst="rect">
+            <a:avLst/>
+          </a:prstGeom>
+          <a:noFill/>
+          <a:ln w="25400" algn="ctr">
+            <a:solidFill>
+              <a:schemeClr val="accent1"/>
+            </a:solidFill>
+            <a:miter lim="800000"/>
+            <a:headEnd/>
+            <a:tailEnd/>
+          </a:ln>
+        </p:spPr>
+        <p:txBody>
+          <a:bodyPr lIns="90000" tIns="72000" rIns="90000" bIns="72000" rtlCol="0" anchor="ctr"/>
+          <a:lstStyle/>
+          <a:p>
+            <a:pPr marR="0" algn="ctr" defTabSz="914400" eaLnBrk="1" fontAlgn="base" latinLnBrk="0" hangingPunct="1">
+              <a:lnSpc>
+                <a:spcPct val="100000"/>
+              </a:lnSpc>
+              <a:spcBef>
+                <a:spcPct val="50000"/>
+              </a:spcBef>
+              <a:spcAft>
+                <a:spcPct val="0"/>
+              </a:spcAft>
+              <a:buClr>
+                <a:srgbClr val="F0AB00"/>
+              </a:buClr>
+              <a:buSzPct val="80000"/>
+              <a:tabLst/>
+            </a:pPr>
+            <a:endParaRPr kumimoji="0" lang="en-US" sz="1800" b="0" i="0" u="none" strike="noStrike" kern="0" cap="none" spc="0" normalizeH="0" baseline="0" noProof="0" dirty="0" err="1">
+              <a:ln>
+                <a:noFill/>
+              </a:ln>
+              <a:effectLst/>
+              <a:uLnTx/>
+              <a:uFillTx/>
+              <a:ea typeface="Arial Unicode MS" pitchFamily="34" charset="-128"/>
+              <a:cs typeface="Arial Unicode MS" pitchFamily="34" charset="-128"/>
+            </a:endParaRPr>
+          </a:p>
+        </p:txBody>
+      </p:sp>
+      <p:sp>
+        <p:nvSpPr>
+          <p:cNvPr id="52" name="TextBox 51">
+            <a:extLst>
+              <a:ext uri="{FF2B5EF4-FFF2-40B4-BE49-F238E27FC236}">
+                <a16:creationId xmlns:a16="http://schemas.microsoft.com/office/drawing/2014/main" id="{7F0AAD1C-E33C-4D96-924F-1FAEEA73F905}"/>
+              </a:ext>
+            </a:extLst>
+          </p:cNvPr>
+          <p:cNvSpPr txBox="1"/>
+          <p:nvPr/>
+        </p:nvSpPr>
+        <p:spPr>
+          <a:xfrm>
+            <a:off x="9581667" y="1003237"/>
+            <a:ext cx="1325532" cy="430887"/>
+          </a:xfrm>
+          <a:prstGeom prst="rect">
+            <a:avLst/>
+          </a:prstGeom>
+          <a:solidFill>
+            <a:schemeClr val="bg1">
+              <a:alpha val="58000"/>
+            </a:schemeClr>
+          </a:solidFill>
+        </p:spPr>
+        <p:txBody>
+          <a:bodyPr wrap="square" lIns="0" tIns="0" rIns="0" bIns="0" rtlCol="0">
+            <a:spAutoFit/>
+          </a:bodyPr>
+          <a:lstStyle>
+            <a:defPPr>
+              <a:defRPr lang="de-DE"/>
+            </a:defPPr>
+            <a:lvl1pPr fontAlgn="base">
+              <a:spcBef>
+                <a:spcPct val="50000"/>
+              </a:spcBef>
+              <a:spcAft>
+                <a:spcPct val="0"/>
+              </a:spcAft>
+              <a:buClr>
+                <a:srgbClr val="F0AB00"/>
+              </a:buClr>
+              <a:buSzPct val="80000"/>
+              <a:defRPr sz="1400" kern="0">
+                <a:latin typeface="Arial Rounded MT Bold" panose="020F0704030504030204" pitchFamily="34" charset="0"/>
+                <a:ea typeface="Arial Unicode MS" pitchFamily="34" charset="-128"/>
+                <a:cs typeface="Arial Unicode MS" pitchFamily="34" charset="-128"/>
+              </a:defRPr>
+            </a:lvl1pPr>
+          </a:lstStyle>
+          <a:p>
+            <a:r>
+              <a:rPr lang="en-US" dirty="0"/>
+              <a:t>Resource management</a:t>
+            </a:r>
+          </a:p>
+        </p:txBody>
+      </p:sp>
+      <p:sp>
+        <p:nvSpPr>
+          <p:cNvPr id="53" name="Rectangle: Rounded Corners 52">
+            <a:extLst>
+              <a:ext uri="{FF2B5EF4-FFF2-40B4-BE49-F238E27FC236}">
+                <a16:creationId xmlns:a16="http://schemas.microsoft.com/office/drawing/2014/main" id="{434BB0BF-EC3D-49A3-B944-062FBA6CC931}"/>
+              </a:ext>
+            </a:extLst>
+          </p:cNvPr>
+          <p:cNvSpPr/>
+          <p:nvPr/>
+        </p:nvSpPr>
+        <p:spPr bwMode="gray">
+          <a:xfrm>
+            <a:off x="9869137" y="4980205"/>
+            <a:ext cx="1523873" cy="565639"/>
+          </a:xfrm>
+          <a:prstGeom prst="roundRect">
+            <a:avLst/>
+          </a:prstGeom>
+          <a:solidFill>
+            <a:srgbClr val="66CCFF"/>
+          </a:solidFill>
+          <a:ln w="12700" algn="ctr">
+            <a:solidFill>
+              <a:schemeClr val="bg1">
+                <a:lumMod val="75000"/>
+              </a:schemeClr>
+            </a:solidFill>
+            <a:miter lim="800000"/>
+            <a:headEnd/>
+            <a:tailEnd/>
+          </a:ln>
+        </p:spPr>
+        <p:txBody>
+          <a:bodyPr lIns="90000" tIns="72000" rIns="90000" bIns="72000" rtlCol="0" anchor="ctr"/>
+          <a:lstStyle/>
+          <a:p>
+            <a:pPr marR="0" algn="ctr" defTabSz="914400" eaLnBrk="1" fontAlgn="base" latinLnBrk="0" hangingPunct="1">
+              <a:lnSpc>
+                <a:spcPct val="100000"/>
+              </a:lnSpc>
+              <a:spcBef>
+                <a:spcPct val="50000"/>
+              </a:spcBef>
+              <a:spcAft>
+                <a:spcPct val="0"/>
+              </a:spcAft>
+              <a:buClr>
+                <a:srgbClr val="F0AB00"/>
+              </a:buClr>
+              <a:buSzPct val="80000"/>
+              <a:tabLst/>
+            </a:pPr>
+            <a:r>
+              <a:rPr kumimoji="0" lang="en-US" sz="1400" b="0" i="0" u="none" strike="noStrike" kern="0" cap="none" spc="0" normalizeH="0" baseline="0" noProof="0" dirty="0">
+                <a:ln>
+                  <a:noFill/>
+                </a:ln>
+                <a:effectLst/>
+                <a:uLnTx/>
+                <a:uFillTx/>
+                <a:ea typeface="Arial Unicode MS" pitchFamily="34" charset="-128"/>
+                <a:cs typeface="Arial Unicode MS" pitchFamily="34" charset="-128"/>
+              </a:rPr>
+              <a:t>(Cluster) Role</a:t>
+            </a:r>
+          </a:p>
+        </p:txBody>
+      </p:sp>
+      <p:sp>
+        <p:nvSpPr>
+          <p:cNvPr id="55" name="Rectangle: Rounded Corners 54">
+            <a:extLst>
+              <a:ext uri="{FF2B5EF4-FFF2-40B4-BE49-F238E27FC236}">
+                <a16:creationId xmlns:a16="http://schemas.microsoft.com/office/drawing/2014/main" id="{ABE6BDAE-48B0-4669-9800-A1142ED5A919}"/>
+              </a:ext>
+            </a:extLst>
+          </p:cNvPr>
+          <p:cNvSpPr/>
+          <p:nvPr/>
+        </p:nvSpPr>
+        <p:spPr bwMode="gray">
+          <a:xfrm>
+            <a:off x="9869136" y="5673929"/>
+            <a:ext cx="1523873" cy="565639"/>
+          </a:xfrm>
+          <a:prstGeom prst="roundRect">
+            <a:avLst/>
+          </a:prstGeom>
+          <a:solidFill>
+            <a:srgbClr val="66CCFF"/>
+          </a:solidFill>
+          <a:ln w="12700" algn="ctr">
+            <a:solidFill>
+              <a:schemeClr val="bg1">
+                <a:lumMod val="75000"/>
+              </a:schemeClr>
+            </a:solidFill>
+            <a:miter lim="800000"/>
+            <a:headEnd/>
+            <a:tailEnd/>
+          </a:ln>
+        </p:spPr>
+        <p:txBody>
+          <a:bodyPr lIns="90000" tIns="72000" rIns="90000" bIns="72000" rtlCol="0" anchor="ctr"/>
+          <a:lstStyle/>
+          <a:p>
+            <a:pPr marR="0" algn="ctr" defTabSz="914400" eaLnBrk="1" fontAlgn="base" latinLnBrk="0" hangingPunct="1">
+              <a:lnSpc>
+                <a:spcPct val="100000"/>
+              </a:lnSpc>
+              <a:spcBef>
+                <a:spcPct val="50000"/>
+              </a:spcBef>
+              <a:spcAft>
+                <a:spcPct val="0"/>
+              </a:spcAft>
+              <a:buClr>
+                <a:srgbClr val="F0AB00"/>
+              </a:buClr>
+              <a:buSzPct val="80000"/>
+              <a:tabLst/>
+            </a:pPr>
+            <a:r>
+              <a:rPr lang="en-US" sz="1400" kern="0" dirty="0">
+                <a:ea typeface="Arial Unicode MS" pitchFamily="34" charset="-128"/>
+                <a:cs typeface="Arial Unicode MS" pitchFamily="34" charset="-128"/>
+              </a:rPr>
+              <a:t>(Cluster) </a:t>
+            </a:r>
+            <a:r>
+              <a:rPr lang="en-US" sz="1400" kern="0" dirty="0" err="1">
+                <a:ea typeface="Arial Unicode MS" pitchFamily="34" charset="-128"/>
+                <a:cs typeface="Arial Unicode MS" pitchFamily="34" charset="-128"/>
+              </a:rPr>
+              <a:t>Rolebinding</a:t>
+            </a:r>
+            <a:endParaRPr kumimoji="0" lang="en-US" sz="1400" b="0" i="0" u="none" strike="noStrike" kern="0" cap="none" spc="0" normalizeH="0" baseline="0" noProof="0" dirty="0">
+              <a:ln>
+                <a:noFill/>
+              </a:ln>
+              <a:effectLst/>
+              <a:uLnTx/>
+              <a:uFillTx/>
+              <a:ea typeface="Arial Unicode MS" pitchFamily="34" charset="-128"/>
+              <a:cs typeface="Arial Unicode MS" pitchFamily="34" charset="-128"/>
+            </a:endParaRPr>
+          </a:p>
+        </p:txBody>
+      </p:sp>
+      <p:sp>
+        <p:nvSpPr>
+          <p:cNvPr id="56" name="Rectangle 55">
+            <a:extLst>
+              <a:ext uri="{FF2B5EF4-FFF2-40B4-BE49-F238E27FC236}">
+                <a16:creationId xmlns:a16="http://schemas.microsoft.com/office/drawing/2014/main" id="{DDDD1B24-7E65-4919-B719-8B1E14477D9A}"/>
+              </a:ext>
+            </a:extLst>
+          </p:cNvPr>
+          <p:cNvSpPr/>
+          <p:nvPr/>
+        </p:nvSpPr>
+        <p:spPr bwMode="gray">
+          <a:xfrm>
+            <a:off x="9597656" y="4139939"/>
+            <a:ext cx="2092821" cy="2265484"/>
+          </a:xfrm>
+          <a:prstGeom prst="rect">
+            <a:avLst/>
+          </a:prstGeom>
+          <a:noFill/>
+          <a:ln w="25400" algn="ctr">
+            <a:solidFill>
+              <a:schemeClr val="accent1"/>
+            </a:solidFill>
+            <a:miter lim="800000"/>
+            <a:headEnd/>
+            <a:tailEnd/>
+          </a:ln>
+        </p:spPr>
+        <p:txBody>
+          <a:bodyPr lIns="90000" tIns="72000" rIns="90000" bIns="72000" rtlCol="0" anchor="ctr"/>
+          <a:lstStyle/>
+          <a:p>
+            <a:pPr marR="0" algn="ctr" defTabSz="914400" eaLnBrk="1" fontAlgn="base" latinLnBrk="0" hangingPunct="1">
+              <a:lnSpc>
+                <a:spcPct val="100000"/>
+              </a:lnSpc>
+              <a:spcBef>
+                <a:spcPct val="50000"/>
+              </a:spcBef>
+              <a:spcAft>
+                <a:spcPct val="0"/>
+              </a:spcAft>
+              <a:buClr>
+                <a:srgbClr val="F0AB00"/>
+              </a:buClr>
+              <a:buSzPct val="80000"/>
+              <a:tabLst/>
+            </a:pPr>
+            <a:endParaRPr kumimoji="0" lang="en-US" sz="1800" b="0" i="0" u="none" strike="noStrike" kern="0" cap="none" spc="0" normalizeH="0" baseline="0" noProof="0" dirty="0" err="1">
+              <a:ln>
+                <a:noFill/>
+              </a:ln>
+              <a:effectLst/>
+              <a:uLnTx/>
+              <a:uFillTx/>
+              <a:ea typeface="Arial Unicode MS" pitchFamily="34" charset="-128"/>
+              <a:cs typeface="Arial Unicode MS" pitchFamily="34" charset="-128"/>
+            </a:endParaRPr>
+          </a:p>
+        </p:txBody>
+      </p:sp>
+      <p:sp>
+        <p:nvSpPr>
+          <p:cNvPr id="57" name="TextBox 56">
+            <a:extLst>
+              <a:ext uri="{FF2B5EF4-FFF2-40B4-BE49-F238E27FC236}">
+                <a16:creationId xmlns:a16="http://schemas.microsoft.com/office/drawing/2014/main" id="{E76634EA-56A7-4020-96F6-7F2C09220939}"/>
+              </a:ext>
+            </a:extLst>
+          </p:cNvPr>
+          <p:cNvSpPr txBox="1"/>
+          <p:nvPr/>
+        </p:nvSpPr>
+        <p:spPr>
+          <a:xfrm>
+            <a:off x="9635571" y="3824552"/>
+            <a:ext cx="335028" cy="215444"/>
+          </a:xfrm>
+          <a:prstGeom prst="rect">
+            <a:avLst/>
+          </a:prstGeom>
+          <a:solidFill>
+            <a:schemeClr val="bg1">
+              <a:alpha val="58000"/>
+            </a:schemeClr>
+          </a:solidFill>
+        </p:spPr>
+        <p:txBody>
+          <a:bodyPr wrap="none" lIns="0" tIns="0" rIns="0" bIns="0" rtlCol="0">
+            <a:spAutoFit/>
+          </a:bodyPr>
+          <a:lstStyle>
+            <a:defPPr>
+              <a:defRPr lang="de-DE"/>
+            </a:defPPr>
+            <a:lvl1pPr fontAlgn="base">
+              <a:spcBef>
+                <a:spcPct val="50000"/>
+              </a:spcBef>
+              <a:spcAft>
+                <a:spcPct val="0"/>
+              </a:spcAft>
+              <a:buClr>
+                <a:srgbClr val="F0AB00"/>
+              </a:buClr>
+              <a:buSzPct val="80000"/>
+              <a:defRPr sz="1400" kern="0">
+                <a:latin typeface="Arial Rounded MT Bold" panose="020F0704030504030204" pitchFamily="34" charset="0"/>
+                <a:ea typeface="Arial Unicode MS" pitchFamily="34" charset="-128"/>
+                <a:cs typeface="Arial Unicode MS" pitchFamily="34" charset="-128"/>
+              </a:defRPr>
+            </a:lvl1pPr>
+          </a:lstStyle>
+          <a:p>
+            <a:r>
+              <a:rPr lang="en-US" dirty="0"/>
+              <a:t>IAM</a:t>
+            </a:r>
+          </a:p>
+        </p:txBody>
+      </p:sp>
+    </p:spTree>
+    <p:extLst>
+      <p:ext uri="{BB962C8B-B14F-4D97-AF65-F5344CB8AC3E}">
+        <p14:creationId xmlns:p14="http://schemas.microsoft.com/office/powerpoint/2010/main" val="11375178"/>
+      </p:ext>
+    </p:extLst>
+  </p:cSld>
+  <p:clrMapOvr>
+    <a:masterClrMapping/>
+  </p:clrMapOvr>
+</p:sld>
+</file>
+
+<file path=ppt/slides/slide5.xml><?xml version="1.0" encoding="utf-8"?>
 <p:sld xmlns:a="http://schemas.openxmlformats.org/drawingml/2006/main" xmlns:r="http://schemas.openxmlformats.org/officeDocument/2006/relationships" xmlns:p="http://schemas.openxmlformats.org/presentationml/2006/main" show="0">
   <p:cSld>
     <p:spTree>

</xml_diff>